<commit_message>
add pros and cons to presentation
</commit_message>
<xml_diff>
--- a/adminfluxdb.pptx
+++ b/adminfluxdb.pptx
@@ -4,13 +4,17 @@
   <p:sldMasterIdLst>
     <p:sldMasterId id="2147493467" r:id="rId4"/>
   </p:sldMasterIdLst>
+  <p:notesMasterIdLst>
+    <p:notesMasterId r:id="rId12"/>
+  </p:notesMasterIdLst>
   <p:sldIdLst>
     <p:sldId id="256" r:id="rId5"/>
     <p:sldId id="257" r:id="rId6"/>
-    <p:sldId id="258" r:id="rId7"/>
-    <p:sldId id="259" r:id="rId8"/>
-    <p:sldId id="260" r:id="rId9"/>
-    <p:sldId id="261" r:id="rId10"/>
+    <p:sldId id="262" r:id="rId7"/>
+    <p:sldId id="258" r:id="rId8"/>
+    <p:sldId id="259" r:id="rId9"/>
+    <p:sldId id="260" r:id="rId10"/>
+    <p:sldId id="261" r:id="rId11"/>
   </p:sldIdLst>
   <p:sldSz cx="9144000" cy="5143500" type="screen16x9"/>
   <p:notesSz cx="6858000" cy="9144000"/>
@@ -110,6 +114,675 @@
     </a:lvl9pPr>
   </p:defaultTextStyle>
 </p:presentation>
+</file>
+
+<file path=ppt/notesMasters/notesMaster1.xml><?xml version="1.0" encoding="utf-8"?>
+<p:notesMaster xmlns:a="http://schemas.openxmlformats.org/drawingml/2006/main" xmlns:r="http://schemas.openxmlformats.org/officeDocument/2006/relationships" xmlns:p="http://schemas.openxmlformats.org/presentationml/2006/main">
+  <p:cSld>
+    <p:bg>
+      <p:bgRef idx="1001">
+        <a:schemeClr val="bg1"/>
+      </p:bgRef>
+    </p:bg>
+    <p:spTree>
+      <p:nvGrpSpPr>
+        <p:cNvPr id="1" name=""/>
+        <p:cNvGrpSpPr/>
+        <p:nvPr/>
+      </p:nvGrpSpPr>
+      <p:grpSpPr>
+        <a:xfrm>
+          <a:off x="0" y="0"/>
+          <a:ext cx="0" cy="0"/>
+          <a:chOff x="0" y="0"/>
+          <a:chExt cx="0" cy="0"/>
+        </a:xfrm>
+      </p:grpSpPr>
+      <p:sp>
+        <p:nvSpPr>
+          <p:cNvPr id="2" name="Header Placeholder 1"/>
+          <p:cNvSpPr>
+            <a:spLocks noGrp="1"/>
+          </p:cNvSpPr>
+          <p:nvPr>
+            <p:ph type="hdr" sz="quarter"/>
+          </p:nvPr>
+        </p:nvSpPr>
+        <p:spPr>
+          <a:xfrm>
+            <a:off x="0" y="0"/>
+            <a:ext cx="2971800" cy="457200"/>
+          </a:xfrm>
+          <a:prstGeom prst="rect">
+            <a:avLst/>
+          </a:prstGeom>
+        </p:spPr>
+        <p:txBody>
+          <a:bodyPr vert="horz" lIns="91440" tIns="45720" rIns="91440" bIns="45720" rtlCol="0"/>
+          <a:lstStyle>
+            <a:lvl1pPr algn="l">
+              <a:defRPr sz="1200"/>
+            </a:lvl1pPr>
+          </a:lstStyle>
+          <a:p>
+            <a:endParaRPr lang="en-US"/>
+          </a:p>
+        </p:txBody>
+      </p:sp>
+      <p:sp>
+        <p:nvSpPr>
+          <p:cNvPr id="3" name="Date Placeholder 2"/>
+          <p:cNvSpPr>
+            <a:spLocks noGrp="1"/>
+          </p:cNvSpPr>
+          <p:nvPr>
+            <p:ph type="dt" idx="1"/>
+          </p:nvPr>
+        </p:nvSpPr>
+        <p:spPr>
+          <a:xfrm>
+            <a:off x="3884613" y="0"/>
+            <a:ext cx="2971800" cy="457200"/>
+          </a:xfrm>
+          <a:prstGeom prst="rect">
+            <a:avLst/>
+          </a:prstGeom>
+        </p:spPr>
+        <p:txBody>
+          <a:bodyPr vert="horz" lIns="91440" tIns="45720" rIns="91440" bIns="45720" rtlCol="0"/>
+          <a:lstStyle>
+            <a:lvl1pPr algn="r">
+              <a:defRPr sz="1200"/>
+            </a:lvl1pPr>
+          </a:lstStyle>
+          <a:p>
+            <a:fld id="{B4458706-247D-834B-B6BF-623D0EFB3977}" type="datetimeFigureOut">
+              <a:rPr lang="en-US" smtClean="0"/>
+              <a:t>27/03/15</a:t>
+            </a:fld>
+            <a:endParaRPr lang="en-US"/>
+          </a:p>
+        </p:txBody>
+      </p:sp>
+      <p:sp>
+        <p:nvSpPr>
+          <p:cNvPr id="4" name="Slide Image Placeholder 3"/>
+          <p:cNvSpPr>
+            <a:spLocks noGrp="1" noRot="1" noChangeAspect="1"/>
+          </p:cNvSpPr>
+          <p:nvPr>
+            <p:ph type="sldImg" idx="2"/>
+          </p:nvPr>
+        </p:nvSpPr>
+        <p:spPr>
+          <a:xfrm>
+            <a:off x="381000" y="685800"/>
+            <a:ext cx="6096000" cy="3429000"/>
+          </a:xfrm>
+          <a:prstGeom prst="rect">
+            <a:avLst/>
+          </a:prstGeom>
+          <a:noFill/>
+          <a:ln w="12700">
+            <a:solidFill>
+              <a:prstClr val="black"/>
+            </a:solidFill>
+          </a:ln>
+        </p:spPr>
+        <p:txBody>
+          <a:bodyPr vert="horz" lIns="91440" tIns="45720" rIns="91440" bIns="45720" rtlCol="0" anchor="ctr"/>
+          <a:lstStyle/>
+          <a:p>
+            <a:endParaRPr lang="en-US"/>
+          </a:p>
+        </p:txBody>
+      </p:sp>
+      <p:sp>
+        <p:nvSpPr>
+          <p:cNvPr id="5" name="Notes Placeholder 4"/>
+          <p:cNvSpPr>
+            <a:spLocks noGrp="1"/>
+          </p:cNvSpPr>
+          <p:nvPr>
+            <p:ph type="body" sz="quarter" idx="3"/>
+          </p:nvPr>
+        </p:nvSpPr>
+        <p:spPr>
+          <a:xfrm>
+            <a:off x="685800" y="4343400"/>
+            <a:ext cx="5486400" cy="4114800"/>
+          </a:xfrm>
+          <a:prstGeom prst="rect">
+            <a:avLst/>
+          </a:prstGeom>
+        </p:spPr>
+        <p:txBody>
+          <a:bodyPr vert="horz" lIns="91440" tIns="45720" rIns="91440" bIns="45720" rtlCol="0"/>
+          <a:lstStyle/>
+          <a:p>
+            <a:pPr lvl="0"/>
+            <a:r>
+              <a:rPr lang="de-DE" smtClean="0"/>
+              <a:t>Click to edit Master text styles</a:t>
+            </a:r>
+          </a:p>
+          <a:p>
+            <a:pPr lvl="1"/>
+            <a:r>
+              <a:rPr lang="de-DE" smtClean="0"/>
+              <a:t>Second level</a:t>
+            </a:r>
+          </a:p>
+          <a:p>
+            <a:pPr lvl="2"/>
+            <a:r>
+              <a:rPr lang="de-DE" smtClean="0"/>
+              <a:t>Third level</a:t>
+            </a:r>
+          </a:p>
+          <a:p>
+            <a:pPr lvl="3"/>
+            <a:r>
+              <a:rPr lang="de-DE" smtClean="0"/>
+              <a:t>Fourth level</a:t>
+            </a:r>
+          </a:p>
+          <a:p>
+            <a:pPr lvl="4"/>
+            <a:r>
+              <a:rPr lang="de-DE" smtClean="0"/>
+              <a:t>Fifth level</a:t>
+            </a:r>
+            <a:endParaRPr lang="en-US"/>
+          </a:p>
+        </p:txBody>
+      </p:sp>
+      <p:sp>
+        <p:nvSpPr>
+          <p:cNvPr id="6" name="Footer Placeholder 5"/>
+          <p:cNvSpPr>
+            <a:spLocks noGrp="1"/>
+          </p:cNvSpPr>
+          <p:nvPr>
+            <p:ph type="ftr" sz="quarter" idx="4"/>
+          </p:nvPr>
+        </p:nvSpPr>
+        <p:spPr>
+          <a:xfrm>
+            <a:off x="0" y="8685213"/>
+            <a:ext cx="2971800" cy="457200"/>
+          </a:xfrm>
+          <a:prstGeom prst="rect">
+            <a:avLst/>
+          </a:prstGeom>
+        </p:spPr>
+        <p:txBody>
+          <a:bodyPr vert="horz" lIns="91440" tIns="45720" rIns="91440" bIns="45720" rtlCol="0" anchor="b"/>
+          <a:lstStyle>
+            <a:lvl1pPr algn="l">
+              <a:defRPr sz="1200"/>
+            </a:lvl1pPr>
+          </a:lstStyle>
+          <a:p>
+            <a:endParaRPr lang="en-US"/>
+          </a:p>
+        </p:txBody>
+      </p:sp>
+      <p:sp>
+        <p:nvSpPr>
+          <p:cNvPr id="7" name="Slide Number Placeholder 6"/>
+          <p:cNvSpPr>
+            <a:spLocks noGrp="1"/>
+          </p:cNvSpPr>
+          <p:nvPr>
+            <p:ph type="sldNum" sz="quarter" idx="5"/>
+          </p:nvPr>
+        </p:nvSpPr>
+        <p:spPr>
+          <a:xfrm>
+            <a:off x="3884613" y="8685213"/>
+            <a:ext cx="2971800" cy="457200"/>
+          </a:xfrm>
+          <a:prstGeom prst="rect">
+            <a:avLst/>
+          </a:prstGeom>
+        </p:spPr>
+        <p:txBody>
+          <a:bodyPr vert="horz" lIns="91440" tIns="45720" rIns="91440" bIns="45720" rtlCol="0" anchor="b"/>
+          <a:lstStyle>
+            <a:lvl1pPr algn="r">
+              <a:defRPr sz="1200"/>
+            </a:lvl1pPr>
+          </a:lstStyle>
+          <a:p>
+            <a:fld id="{8F02F506-0DE5-BF4F-9118-E0A27549203C}" type="slidenum">
+              <a:rPr lang="en-US" smtClean="0"/>
+              <a:t>‹#›</a:t>
+            </a:fld>
+            <a:endParaRPr lang="en-US"/>
+          </a:p>
+        </p:txBody>
+      </p:sp>
+    </p:spTree>
+    <p:extLst>
+      <p:ext uri="{BB962C8B-B14F-4D97-AF65-F5344CB8AC3E}">
+        <p14:creationId xmlns:p14="http://schemas.microsoft.com/office/powerpoint/2010/main" val="2108419193"/>
+      </p:ext>
+    </p:extLst>
+  </p:cSld>
+  <p:clrMap bg1="lt1" tx1="dk1" bg2="lt2" tx2="dk2" accent1="accent1" accent2="accent2" accent3="accent3" accent4="accent4" accent5="accent5" accent6="accent6" hlink="hlink" folHlink="folHlink"/>
+  <p:notesStyle>
+    <a:lvl1pPr marL="0" algn="l" defTabSz="457200" rtl="0" eaLnBrk="1" latinLnBrk="0" hangingPunct="1">
+      <a:defRPr sz="1200" kern="1200">
+        <a:solidFill>
+          <a:schemeClr val="tx1"/>
+        </a:solidFill>
+        <a:latin typeface="+mn-lt"/>
+        <a:ea typeface="+mn-ea"/>
+        <a:cs typeface="+mn-cs"/>
+      </a:defRPr>
+    </a:lvl1pPr>
+    <a:lvl2pPr marL="457200" algn="l" defTabSz="457200" rtl="0" eaLnBrk="1" latinLnBrk="0" hangingPunct="1">
+      <a:defRPr sz="1200" kern="1200">
+        <a:solidFill>
+          <a:schemeClr val="tx1"/>
+        </a:solidFill>
+        <a:latin typeface="+mn-lt"/>
+        <a:ea typeface="+mn-ea"/>
+        <a:cs typeface="+mn-cs"/>
+      </a:defRPr>
+    </a:lvl2pPr>
+    <a:lvl3pPr marL="914400" algn="l" defTabSz="457200" rtl="0" eaLnBrk="1" latinLnBrk="0" hangingPunct="1">
+      <a:defRPr sz="1200" kern="1200">
+        <a:solidFill>
+          <a:schemeClr val="tx1"/>
+        </a:solidFill>
+        <a:latin typeface="+mn-lt"/>
+        <a:ea typeface="+mn-ea"/>
+        <a:cs typeface="+mn-cs"/>
+      </a:defRPr>
+    </a:lvl3pPr>
+    <a:lvl4pPr marL="1371600" algn="l" defTabSz="457200" rtl="0" eaLnBrk="1" latinLnBrk="0" hangingPunct="1">
+      <a:defRPr sz="1200" kern="1200">
+        <a:solidFill>
+          <a:schemeClr val="tx1"/>
+        </a:solidFill>
+        <a:latin typeface="+mn-lt"/>
+        <a:ea typeface="+mn-ea"/>
+        <a:cs typeface="+mn-cs"/>
+      </a:defRPr>
+    </a:lvl4pPr>
+    <a:lvl5pPr marL="1828800" algn="l" defTabSz="457200" rtl="0" eaLnBrk="1" latinLnBrk="0" hangingPunct="1">
+      <a:defRPr sz="1200" kern="1200">
+        <a:solidFill>
+          <a:schemeClr val="tx1"/>
+        </a:solidFill>
+        <a:latin typeface="+mn-lt"/>
+        <a:ea typeface="+mn-ea"/>
+        <a:cs typeface="+mn-cs"/>
+      </a:defRPr>
+    </a:lvl5pPr>
+    <a:lvl6pPr marL="2286000" algn="l" defTabSz="457200" rtl="0" eaLnBrk="1" latinLnBrk="0" hangingPunct="1">
+      <a:defRPr sz="1200" kern="1200">
+        <a:solidFill>
+          <a:schemeClr val="tx1"/>
+        </a:solidFill>
+        <a:latin typeface="+mn-lt"/>
+        <a:ea typeface="+mn-ea"/>
+        <a:cs typeface="+mn-cs"/>
+      </a:defRPr>
+    </a:lvl6pPr>
+    <a:lvl7pPr marL="2743200" algn="l" defTabSz="457200" rtl="0" eaLnBrk="1" latinLnBrk="0" hangingPunct="1">
+      <a:defRPr sz="1200" kern="1200">
+        <a:solidFill>
+          <a:schemeClr val="tx1"/>
+        </a:solidFill>
+        <a:latin typeface="+mn-lt"/>
+        <a:ea typeface="+mn-ea"/>
+        <a:cs typeface="+mn-cs"/>
+      </a:defRPr>
+    </a:lvl7pPr>
+    <a:lvl8pPr marL="3200400" algn="l" defTabSz="457200" rtl="0" eaLnBrk="1" latinLnBrk="0" hangingPunct="1">
+      <a:defRPr sz="1200" kern="1200">
+        <a:solidFill>
+          <a:schemeClr val="tx1"/>
+        </a:solidFill>
+        <a:latin typeface="+mn-lt"/>
+        <a:ea typeface="+mn-ea"/>
+        <a:cs typeface="+mn-cs"/>
+      </a:defRPr>
+    </a:lvl8pPr>
+    <a:lvl9pPr marL="3657600" algn="l" defTabSz="457200" rtl="0" eaLnBrk="1" latinLnBrk="0" hangingPunct="1">
+      <a:defRPr sz="1200" kern="1200">
+        <a:solidFill>
+          <a:schemeClr val="tx1"/>
+        </a:solidFill>
+        <a:latin typeface="+mn-lt"/>
+        <a:ea typeface="+mn-ea"/>
+        <a:cs typeface="+mn-cs"/>
+      </a:defRPr>
+    </a:lvl9pPr>
+  </p:notesStyle>
+</p:notesMaster>
+</file>
+
+<file path=ppt/notesSlides/notesSlide1.xml><?xml version="1.0" encoding="utf-8"?>
+<p:notes xmlns:a="http://schemas.openxmlformats.org/drawingml/2006/main" xmlns:r="http://schemas.openxmlformats.org/officeDocument/2006/relationships" xmlns:p="http://schemas.openxmlformats.org/presentationml/2006/main">
+  <p:cSld>
+    <p:spTree>
+      <p:nvGrpSpPr>
+        <p:cNvPr id="1" name=""/>
+        <p:cNvGrpSpPr/>
+        <p:nvPr/>
+      </p:nvGrpSpPr>
+      <p:grpSpPr>
+        <a:xfrm>
+          <a:off x="0" y="0"/>
+          <a:ext cx="0" cy="0"/>
+          <a:chOff x="0" y="0"/>
+          <a:chExt cx="0" cy="0"/>
+        </a:xfrm>
+      </p:grpSpPr>
+      <p:sp>
+        <p:nvSpPr>
+          <p:cNvPr id="2" name="Slide Image Placeholder 1"/>
+          <p:cNvSpPr>
+            <a:spLocks noGrp="1" noRot="1" noChangeAspect="1"/>
+          </p:cNvSpPr>
+          <p:nvPr>
+            <p:ph type="sldImg"/>
+          </p:nvPr>
+        </p:nvSpPr>
+        <p:spPr/>
+      </p:sp>
+      <p:sp>
+        <p:nvSpPr>
+          <p:cNvPr id="3" name="Notes Placeholder 2"/>
+          <p:cNvSpPr>
+            <a:spLocks noGrp="1"/>
+          </p:cNvSpPr>
+          <p:nvPr>
+            <p:ph type="body" idx="1"/>
+          </p:nvPr>
+        </p:nvSpPr>
+        <p:spPr/>
+        <p:txBody>
+          <a:bodyPr/>
+          <a:lstStyle/>
+          <a:p>
+            <a:pPr marL="0" marR="0" lvl="1" indent="0" algn="l" defTabSz="457200" rtl="0" eaLnBrk="1" fontAlgn="auto" latinLnBrk="0" hangingPunct="1">
+              <a:lnSpc>
+                <a:spcPct val="100000"/>
+              </a:lnSpc>
+              <a:spcBef>
+                <a:spcPts val="0"/>
+              </a:spcBef>
+              <a:spcAft>
+                <a:spcPts val="0"/>
+              </a:spcAft>
+              <a:buClrTx/>
+              <a:buSzTx/>
+              <a:buFontTx/>
+              <a:buNone/>
+              <a:tabLst/>
+              <a:defRPr/>
+            </a:pPr>
+            <a:r>
+              <a:rPr lang="en-US" dirty="0" smtClean="0"/>
+              <a:t>no pagination. If your query returns 2 million data points, the browser will list 2 million data points</a:t>
+            </a:r>
+          </a:p>
+          <a:p>
+            <a:endParaRPr lang="en-US" dirty="0"/>
+          </a:p>
+        </p:txBody>
+      </p:sp>
+      <p:sp>
+        <p:nvSpPr>
+          <p:cNvPr id="4" name="Slide Number Placeholder 3"/>
+          <p:cNvSpPr>
+            <a:spLocks noGrp="1"/>
+          </p:cNvSpPr>
+          <p:nvPr>
+            <p:ph type="sldNum" sz="quarter" idx="10"/>
+          </p:nvPr>
+        </p:nvSpPr>
+        <p:spPr/>
+        <p:txBody>
+          <a:bodyPr/>
+          <a:lstStyle/>
+          <a:p>
+            <a:fld id="{8F02F506-0DE5-BF4F-9118-E0A27549203C}" type="slidenum">
+              <a:rPr lang="en-US" smtClean="0"/>
+              <a:t>2</a:t>
+            </a:fld>
+            <a:endParaRPr lang="en-US"/>
+          </a:p>
+        </p:txBody>
+      </p:sp>
+    </p:spTree>
+    <p:extLst>
+      <p:ext uri="{BB962C8B-B14F-4D97-AF65-F5344CB8AC3E}">
+        <p14:creationId xmlns:p14="http://schemas.microsoft.com/office/powerpoint/2010/main" val="3591865242"/>
+      </p:ext>
+    </p:extLst>
+  </p:cSld>
+  <p:clrMapOvr>
+    <a:masterClrMapping/>
+  </p:clrMapOvr>
+</p:notes>
+</file>
+
+<file path=ppt/notesSlides/notesSlide2.xml><?xml version="1.0" encoding="utf-8"?>
+<p:notes xmlns:a="http://schemas.openxmlformats.org/drawingml/2006/main" xmlns:r="http://schemas.openxmlformats.org/officeDocument/2006/relationships" xmlns:p="http://schemas.openxmlformats.org/presentationml/2006/main">
+  <p:cSld>
+    <p:spTree>
+      <p:nvGrpSpPr>
+        <p:cNvPr id="1" name=""/>
+        <p:cNvGrpSpPr/>
+        <p:nvPr/>
+      </p:nvGrpSpPr>
+      <p:grpSpPr>
+        <a:xfrm>
+          <a:off x="0" y="0"/>
+          <a:ext cx="0" cy="0"/>
+          <a:chOff x="0" y="0"/>
+          <a:chExt cx="0" cy="0"/>
+        </a:xfrm>
+      </p:grpSpPr>
+      <p:sp>
+        <p:nvSpPr>
+          <p:cNvPr id="2" name="Slide Image Placeholder 1"/>
+          <p:cNvSpPr>
+            <a:spLocks noGrp="1" noRot="1" noChangeAspect="1"/>
+          </p:cNvSpPr>
+          <p:nvPr>
+            <p:ph type="sldImg"/>
+          </p:nvPr>
+        </p:nvSpPr>
+        <p:spPr/>
+      </p:sp>
+      <p:sp>
+        <p:nvSpPr>
+          <p:cNvPr id="3" name="Notes Placeholder 2"/>
+          <p:cNvSpPr>
+            <a:spLocks noGrp="1"/>
+          </p:cNvSpPr>
+          <p:nvPr>
+            <p:ph type="body" idx="1"/>
+          </p:nvPr>
+        </p:nvSpPr>
+        <p:spPr/>
+        <p:txBody>
+          <a:bodyPr/>
+          <a:lstStyle/>
+          <a:p>
+            <a:r>
+              <a:rPr lang="en-US" sz="1200" kern="1200" dirty="0" smtClean="0">
+                <a:solidFill>
+                  <a:schemeClr val="tx1"/>
+                </a:solidFill>
+                <a:latin typeface="+mn-lt"/>
+                <a:ea typeface="+mn-ea"/>
+                <a:cs typeface="+mn-cs"/>
+              </a:rPr>
+              <a:t>no history of commands. We keep having to enter the same command again and again and again.</a:t>
+            </a:r>
+            <a:endParaRPr lang="en-US" dirty="0"/>
+          </a:p>
+        </p:txBody>
+      </p:sp>
+      <p:sp>
+        <p:nvSpPr>
+          <p:cNvPr id="4" name="Slide Number Placeholder 3"/>
+          <p:cNvSpPr>
+            <a:spLocks noGrp="1"/>
+          </p:cNvSpPr>
+          <p:nvPr>
+            <p:ph type="sldNum" sz="quarter" idx="10"/>
+          </p:nvPr>
+        </p:nvSpPr>
+        <p:spPr/>
+        <p:txBody>
+          <a:bodyPr/>
+          <a:lstStyle/>
+          <a:p>
+            <a:fld id="{8F02F506-0DE5-BF4F-9118-E0A27549203C}" type="slidenum">
+              <a:rPr lang="en-US" smtClean="0"/>
+              <a:t>3</a:t>
+            </a:fld>
+            <a:endParaRPr lang="en-US"/>
+          </a:p>
+        </p:txBody>
+      </p:sp>
+    </p:spTree>
+    <p:extLst>
+      <p:ext uri="{BB962C8B-B14F-4D97-AF65-F5344CB8AC3E}">
+        <p14:creationId xmlns:p14="http://schemas.microsoft.com/office/powerpoint/2010/main" val="3455880193"/>
+      </p:ext>
+    </p:extLst>
+  </p:cSld>
+  <p:clrMapOvr>
+    <a:masterClrMapping/>
+  </p:clrMapOvr>
+</p:notes>
+</file>
+
+<file path=ppt/notesSlides/notesSlide3.xml><?xml version="1.0" encoding="utf-8"?>
+<p:notes xmlns:a="http://schemas.openxmlformats.org/drawingml/2006/main" xmlns:r="http://schemas.openxmlformats.org/officeDocument/2006/relationships" xmlns:p="http://schemas.openxmlformats.org/presentationml/2006/main">
+  <p:cSld>
+    <p:spTree>
+      <p:nvGrpSpPr>
+        <p:cNvPr id="1" name=""/>
+        <p:cNvGrpSpPr/>
+        <p:nvPr/>
+      </p:nvGrpSpPr>
+      <p:grpSpPr>
+        <a:xfrm>
+          <a:off x="0" y="0"/>
+          <a:ext cx="0" cy="0"/>
+          <a:chOff x="0" y="0"/>
+          <a:chExt cx="0" cy="0"/>
+        </a:xfrm>
+      </p:grpSpPr>
+      <p:sp>
+        <p:nvSpPr>
+          <p:cNvPr id="2" name="Slide Image Placeholder 1"/>
+          <p:cNvSpPr>
+            <a:spLocks noGrp="1" noRot="1" noChangeAspect="1"/>
+          </p:cNvSpPr>
+          <p:nvPr>
+            <p:ph type="sldImg"/>
+          </p:nvPr>
+        </p:nvSpPr>
+        <p:spPr/>
+      </p:sp>
+      <p:sp>
+        <p:nvSpPr>
+          <p:cNvPr id="3" name="Notes Placeholder 2"/>
+          <p:cNvSpPr>
+            <a:spLocks noGrp="1"/>
+          </p:cNvSpPr>
+          <p:nvPr>
+            <p:ph type="body" idx="1"/>
+          </p:nvPr>
+        </p:nvSpPr>
+        <p:spPr/>
+        <p:txBody>
+          <a:bodyPr/>
+          <a:lstStyle/>
+          <a:p>
+            <a:r>
+              <a:rPr lang="en-US" dirty="0" smtClean="0"/>
+              <a:t>Pagination! You can now pull 2 million data points in one query and browse them page for page, because the tool stores the full result in the webserver, not in the client</a:t>
+            </a:r>
+          </a:p>
+          <a:p>
+            <a:endParaRPr lang="en-US" dirty="0" smtClean="0"/>
+          </a:p>
+          <a:p>
+            <a:r>
+              <a:rPr lang="en-US" dirty="0" smtClean="0"/>
+              <a:t>Caching. The tool caches the results for a couple of minutes so that you can re-use them without having to wait for the database. You can of course also tell it to get fresh data instead.</a:t>
+            </a:r>
+          </a:p>
+          <a:p>
+            <a:endParaRPr lang="en-US" dirty="0" smtClean="0"/>
+          </a:p>
+          <a:p>
+            <a:r>
+              <a:rPr lang="en-US" dirty="0" smtClean="0"/>
+              <a:t>Better handling of timestamps: they are displayed in both the internal and a human readable format</a:t>
+            </a:r>
+          </a:p>
+          <a:p>
+            <a:endParaRPr lang="en-US" dirty="0" smtClean="0"/>
+          </a:p>
+          <a:p>
+            <a:r>
+              <a:rPr lang="en-US" dirty="0" smtClean="0"/>
+              <a:t>Auto limit. If you run a select query against the database and forget to add a limit clause, the tool will add it for you, so that you don't kill the database.</a:t>
+            </a:r>
+          </a:p>
+          <a:p>
+            <a:endParaRPr lang="en-US" dirty="0"/>
+          </a:p>
+        </p:txBody>
+      </p:sp>
+      <p:sp>
+        <p:nvSpPr>
+          <p:cNvPr id="4" name="Slide Number Placeholder 3"/>
+          <p:cNvSpPr>
+            <a:spLocks noGrp="1"/>
+          </p:cNvSpPr>
+          <p:nvPr>
+            <p:ph type="sldNum" sz="quarter" idx="10"/>
+          </p:nvPr>
+        </p:nvSpPr>
+        <p:spPr/>
+        <p:txBody>
+          <a:bodyPr/>
+          <a:lstStyle/>
+          <a:p>
+            <a:fld id="{8F02F506-0DE5-BF4F-9118-E0A27549203C}" type="slidenum">
+              <a:rPr lang="en-US" smtClean="0"/>
+              <a:t>4</a:t>
+            </a:fld>
+            <a:endParaRPr lang="en-US"/>
+          </a:p>
+        </p:txBody>
+      </p:sp>
+    </p:spTree>
+    <p:extLst>
+      <p:ext uri="{BB962C8B-B14F-4D97-AF65-F5344CB8AC3E}">
+        <p14:creationId xmlns:p14="http://schemas.microsoft.com/office/powerpoint/2010/main" val="2719542430"/>
+      </p:ext>
+    </p:extLst>
+  </p:cSld>
+  <p:clrMapOvr>
+    <a:masterClrMapping/>
+  </p:clrMapOvr>
+</p:notes>
 </file>
 
 <file path=ppt/slideLayouts/slideLayout1.xml><?xml version="1.0" encoding="utf-8"?>
@@ -3852,7 +4525,11 @@
           <a:bodyPr/>
           <a:lstStyle/>
           <a:p>
-            <a:endParaRPr lang="en-US"/>
+            <a:r>
+              <a:rPr lang="en-US" dirty="0" smtClean="0"/>
+              <a:t>Old tool works, BUT…</a:t>
+            </a:r>
+            <a:endParaRPr lang="en-US" dirty="0"/>
           </a:p>
         </p:txBody>
       </p:sp>
@@ -3866,12 +4543,118 @@
             <p:ph idx="1"/>
           </p:nvPr>
         </p:nvSpPr>
-        <p:spPr/>
-        <p:txBody>
-          <a:bodyPr/>
-          <a:lstStyle/>
-          <a:p>
-            <a:endParaRPr lang="en-US"/>
+        <p:spPr>
+          <a:xfrm>
+            <a:off x="549275" y="1200151"/>
+            <a:ext cx="8042276" cy="2931141"/>
+          </a:xfrm>
+        </p:spPr>
+        <p:txBody>
+          <a:bodyPr>
+            <a:normAutofit fontScale="92500" lnSpcReduction="20000"/>
+          </a:bodyPr>
+          <a:lstStyle/>
+          <a:p>
+            <a:r>
+              <a:rPr lang="en-US" dirty="0" smtClean="0"/>
+              <a:t>No information if</a:t>
+            </a:r>
+            <a:endParaRPr lang="en-US" dirty="0"/>
+          </a:p>
+          <a:p>
+            <a:pPr lvl="1"/>
+            <a:r>
+              <a:rPr lang="en-US" dirty="0" smtClean="0"/>
+              <a:t>query </a:t>
+            </a:r>
+            <a:r>
+              <a:rPr lang="en-US" dirty="0"/>
+              <a:t>is still running</a:t>
+            </a:r>
+          </a:p>
+          <a:p>
+            <a:pPr lvl="1"/>
+            <a:r>
+              <a:rPr lang="en-US" dirty="0" smtClean="0"/>
+              <a:t>query </a:t>
+            </a:r>
+            <a:r>
+              <a:rPr lang="en-US" dirty="0"/>
+              <a:t>returned zero results</a:t>
+            </a:r>
+          </a:p>
+          <a:p>
+            <a:pPr lvl="1"/>
+            <a:r>
+              <a:rPr lang="en-US" dirty="0" smtClean="0"/>
+              <a:t>query </a:t>
+            </a:r>
+            <a:r>
+              <a:rPr lang="en-US" dirty="0"/>
+              <a:t>returned </a:t>
+            </a:r>
+            <a:r>
+              <a:rPr lang="en-US" dirty="0" smtClean="0"/>
+              <a:t>an amount of data the </a:t>
+            </a:r>
+            <a:r>
+              <a:rPr lang="en-US" dirty="0"/>
+              <a:t>browser cannot </a:t>
+            </a:r>
+            <a:r>
+              <a:rPr lang="en-US" dirty="0" smtClean="0"/>
+              <a:t>handle</a:t>
+            </a:r>
+            <a:endParaRPr lang="en-US" dirty="0"/>
+          </a:p>
+          <a:p>
+            <a:r>
+              <a:rPr lang="en-US" dirty="0"/>
+              <a:t>B</a:t>
+            </a:r>
+            <a:r>
+              <a:rPr lang="en-US" dirty="0" smtClean="0"/>
+              <a:t>rowser </a:t>
+            </a:r>
+            <a:r>
+              <a:rPr lang="en-US" dirty="0"/>
+              <a:t>often dies </a:t>
+            </a:r>
+            <a:r>
+              <a:rPr lang="en-US" dirty="0" smtClean="0"/>
+              <a:t>on trying </a:t>
+            </a:r>
+            <a:r>
+              <a:rPr lang="en-US" dirty="0"/>
+              <a:t>to display </a:t>
+            </a:r>
+            <a:r>
+              <a:rPr lang="en-US" dirty="0" smtClean="0"/>
+              <a:t>results</a:t>
+            </a:r>
+            <a:r>
+              <a:rPr lang="en-US" dirty="0"/>
+              <a:t>, because</a:t>
+            </a:r>
+          </a:p>
+          <a:p>
+            <a:pPr lvl="1"/>
+            <a:r>
+              <a:rPr lang="en-US" dirty="0" smtClean="0"/>
+              <a:t>renders </a:t>
+            </a:r>
+            <a:r>
+              <a:rPr lang="en-US" dirty="0"/>
+              <a:t>graphs for every result </a:t>
+            </a:r>
+          </a:p>
+          <a:p>
+            <a:pPr lvl="1"/>
+            <a:r>
+              <a:rPr lang="en-US" dirty="0" smtClean="0"/>
+              <a:t>no pagination</a:t>
+            </a:r>
+            <a:endParaRPr lang="en-US" dirty="0"/>
           </a:p>
         </p:txBody>
       </p:sp>
@@ -3920,7 +4703,15 @@
           <a:bodyPr/>
           <a:lstStyle/>
           <a:p>
-            <a:endParaRPr lang="en-US"/>
+            <a:r>
+              <a:rPr lang="en-US" dirty="0" smtClean="0"/>
+              <a:t>Old tool works</a:t>
+            </a:r>
+            <a:r>
+              <a:rPr lang="en-US" smtClean="0"/>
+              <a:t>, BUT…</a:t>
+            </a:r>
+            <a:endParaRPr lang="en-US" dirty="0"/>
           </a:p>
         </p:txBody>
       </p:sp>
@@ -3936,17 +4727,74 @@
         </p:nvSpPr>
         <p:spPr/>
         <p:txBody>
-          <a:bodyPr/>
-          <a:lstStyle/>
-          <a:p>
-            <a:endParaRPr lang="en-US"/>
+          <a:bodyPr>
+            <a:normAutofit/>
+          </a:bodyPr>
+          <a:lstStyle/>
+          <a:p>
+            <a:r>
+              <a:rPr lang="en-US" dirty="0" smtClean="0"/>
+              <a:t>No back button functionality </a:t>
+            </a:r>
+            <a:endParaRPr lang="en-US" dirty="0"/>
+          </a:p>
+          <a:p>
+            <a:r>
+              <a:rPr lang="en-US" dirty="0"/>
+              <a:t>N</a:t>
+            </a:r>
+            <a:r>
+              <a:rPr lang="en-US" dirty="0" smtClean="0"/>
+              <a:t>o </a:t>
+            </a:r>
+            <a:r>
+              <a:rPr lang="en-US" dirty="0"/>
+              <a:t>history of </a:t>
+            </a:r>
+            <a:r>
+              <a:rPr lang="en-US" dirty="0" smtClean="0"/>
+              <a:t>commands</a:t>
+            </a:r>
+          </a:p>
+          <a:p>
+            <a:r>
+              <a:rPr lang="en-US" dirty="0" smtClean="0"/>
+              <a:t>Timestamps </a:t>
+            </a:r>
+            <a:r>
+              <a:rPr lang="en-US" dirty="0"/>
+              <a:t>are not human </a:t>
+            </a:r>
+            <a:r>
+              <a:rPr lang="en-US" dirty="0" smtClean="0"/>
+              <a:t>readable</a:t>
+            </a:r>
+          </a:p>
+          <a:p>
+            <a:r>
+              <a:rPr lang="en-US" dirty="0"/>
+              <a:t>Y</a:t>
+            </a:r>
+            <a:r>
+              <a:rPr lang="en-US" dirty="0" smtClean="0"/>
+              <a:t>ou </a:t>
+            </a:r>
+            <a:r>
+              <a:rPr lang="en-US" dirty="0"/>
+              <a:t>never know in which database you are </a:t>
+            </a:r>
+            <a:r>
+              <a:rPr lang="en-US" dirty="0" smtClean="0"/>
+              <a:t>working</a:t>
+            </a:r>
+            <a:endParaRPr lang="en-US" dirty="0"/>
           </a:p>
         </p:txBody>
       </p:sp>
     </p:spTree>
     <p:extLst>
       <p:ext uri="{BB962C8B-B14F-4D97-AF65-F5344CB8AC3E}">
-        <p14:creationId xmlns:p14="http://schemas.microsoft.com/office/powerpoint/2010/main" val="2331899560"/>
+        <p14:creationId xmlns:p14="http://schemas.microsoft.com/office/powerpoint/2010/main" val="2940480143"/>
       </p:ext>
     </p:extLst>
   </p:cSld>
@@ -3988,7 +4836,31 @@
           <a:bodyPr/>
           <a:lstStyle/>
           <a:p>
-            <a:endParaRPr lang="en-US"/>
+            <a:r>
+              <a:rPr lang="en-US" dirty="0" err="1" smtClean="0">
+                <a:solidFill>
+                  <a:srgbClr val="A6A6A6"/>
+                </a:solidFill>
+              </a:rPr>
+              <a:t>Adm</a:t>
+            </a:r>
+            <a:r>
+              <a:rPr lang="en-US" dirty="0" err="1" smtClean="0"/>
+              <a:t>influx</a:t>
+            </a:r>
+            <a:r>
+              <a:rPr lang="en-US" dirty="0" err="1" smtClean="0">
+                <a:solidFill>
+                  <a:srgbClr val="A6A6A6"/>
+                </a:solidFill>
+              </a:rPr>
+              <a:t>DB</a:t>
+            </a:r>
+            <a:endParaRPr lang="en-US" dirty="0">
+              <a:solidFill>
+                <a:srgbClr val="A6A6A6"/>
+              </a:solidFill>
+            </a:endParaRPr>
           </a:p>
         </p:txBody>
       </p:sp>
@@ -4002,19 +4874,407 @@
             <p:ph idx="1"/>
           </p:nvPr>
         </p:nvSpPr>
-        <p:spPr/>
-        <p:txBody>
-          <a:bodyPr/>
-          <a:lstStyle/>
-          <a:p>
-            <a:endParaRPr lang="en-US"/>
+        <p:spPr>
+          <a:xfrm>
+            <a:off x="549275" y="1200152"/>
+            <a:ext cx="4019632" cy="2675320"/>
+          </a:xfrm>
+        </p:spPr>
+        <p:txBody>
+          <a:bodyPr>
+            <a:normAutofit fontScale="92500" lnSpcReduction="10000"/>
+          </a:bodyPr>
+          <a:lstStyle/>
+          <a:p>
+            <a:r>
+              <a:rPr lang="en-US" dirty="0" smtClean="0"/>
+              <a:t>Proper UI </a:t>
+            </a:r>
+            <a:r>
+              <a:rPr lang="en-US" dirty="0"/>
+              <a:t>/ </a:t>
+            </a:r>
+            <a:r>
+              <a:rPr lang="en-US" dirty="0"/>
+              <a:t/>
+            </a:r>
+            <a:br>
+              <a:rPr lang="en-US" dirty="0"/>
+            </a:br>
+            <a:r>
+              <a:rPr lang="en-US" dirty="0" smtClean="0"/>
+              <a:t>button </a:t>
+            </a:r>
+            <a:r>
+              <a:rPr lang="en-US" dirty="0"/>
+              <a:t>feedback</a:t>
+            </a:r>
+          </a:p>
+          <a:p>
+            <a:r>
+              <a:rPr lang="en-US" dirty="0"/>
+              <a:t>F</a:t>
+            </a:r>
+            <a:r>
+              <a:rPr lang="en-US" dirty="0" smtClean="0"/>
+              <a:t>ull back-button </a:t>
+            </a:r>
+            <a:r>
+              <a:rPr lang="en-US" dirty="0"/>
+              <a:t>functionality</a:t>
+            </a:r>
+          </a:p>
+          <a:p>
+            <a:r>
+              <a:rPr lang="en-US" dirty="0" smtClean="0"/>
+              <a:t>Pagination</a:t>
+            </a:r>
+          </a:p>
+          <a:p>
+            <a:r>
+              <a:rPr lang="en-US" dirty="0" smtClean="0"/>
+              <a:t>Command history</a:t>
+            </a:r>
+            <a:endParaRPr lang="en-US" dirty="0"/>
+          </a:p>
+        </p:txBody>
+      </p:sp>
+      <p:sp>
+        <p:nvSpPr>
+          <p:cNvPr id="4" name="Rectangle 3"/>
+          <p:cNvSpPr/>
+          <p:nvPr/>
+        </p:nvSpPr>
+        <p:spPr>
+          <a:xfrm>
+            <a:off x="549275" y="4024093"/>
+            <a:ext cx="8042276" cy="874086"/>
+          </a:xfrm>
+          <a:prstGeom prst="rect">
+            <a:avLst/>
+          </a:prstGeom>
+        </p:spPr>
+        <p:style>
+          <a:lnRef idx="1">
+            <a:schemeClr val="accent1"/>
+          </a:lnRef>
+          <a:fillRef idx="3">
+            <a:schemeClr val="accent1"/>
+          </a:fillRef>
+          <a:effectRef idx="2">
+            <a:schemeClr val="accent1"/>
+          </a:effectRef>
+          <a:fontRef idx="minor">
+            <a:schemeClr val="lt1"/>
+          </a:fontRef>
+        </p:style>
+        <p:txBody>
+          <a:bodyPr rtlCol="0" anchor="ctr"/>
+          <a:lstStyle/>
+          <a:p>
+            <a:pPr algn="ctr"/>
+            <a:r>
+              <a:rPr lang="en-US" dirty="0" smtClean="0"/>
+              <a:t>Focus </a:t>
+            </a:r>
+            <a:r>
+              <a:rPr lang="en-US" dirty="0"/>
+              <a:t>on just the data retrieval. </a:t>
+            </a:r>
+            <a:endParaRPr lang="en-US" dirty="0" smtClean="0"/>
+          </a:p>
+          <a:p>
+            <a:pPr algn="ctr"/>
+            <a:r>
+              <a:rPr lang="en-US" dirty="0" smtClean="0"/>
+              <a:t>No </a:t>
+            </a:r>
+            <a:r>
+              <a:rPr lang="en-US" dirty="0"/>
+              <a:t>administrative stuff like user management or database creation</a:t>
+            </a:r>
+            <a:endParaRPr lang="en-US" dirty="0"/>
+          </a:p>
+        </p:txBody>
+      </p:sp>
+      <p:sp>
+        <p:nvSpPr>
+          <p:cNvPr id="5" name="Content Placeholder 2"/>
+          <p:cNvSpPr txBox="1">
+            <a:spLocks/>
+          </p:cNvSpPr>
+          <p:nvPr/>
+        </p:nvSpPr>
+        <p:spPr>
+          <a:xfrm>
+            <a:off x="4721307" y="1200344"/>
+            <a:ext cx="4019632" cy="2675320"/>
+          </a:xfrm>
+          <a:prstGeom prst="rect">
+            <a:avLst/>
+          </a:prstGeom>
+        </p:spPr>
+        <p:txBody>
+          <a:bodyPr vert="horz" lIns="91440" tIns="45720" rIns="91440" bIns="45720" rtlCol="0">
+            <a:normAutofit lnSpcReduction="10000"/>
+          </a:bodyPr>
+          <a:lstStyle>
+            <a:lvl1pPr marL="349250" indent="-349250" algn="l" defTabSz="914400" rtl="0" eaLnBrk="1" latinLnBrk="0" hangingPunct="1">
+              <a:spcBef>
+                <a:spcPts val="2000"/>
+              </a:spcBef>
+              <a:buClr>
+                <a:schemeClr val="accent1">
+                  <a:lumMod val="60000"/>
+                  <a:lumOff val="40000"/>
+                </a:schemeClr>
+              </a:buClr>
+              <a:buSzPct val="110000"/>
+              <a:buFont typeface="Wingdings 2" pitchFamily="18" charset="2"/>
+              <a:buChar char=""/>
+              <a:defRPr sz="2400" kern="1200">
+                <a:solidFill>
+                  <a:schemeClr val="tx1">
+                    <a:lumMod val="65000"/>
+                    <a:lumOff val="35000"/>
+                  </a:schemeClr>
+                </a:solidFill>
+                <a:latin typeface="+mn-lt"/>
+                <a:ea typeface="+mn-ea"/>
+                <a:cs typeface="+mn-cs"/>
+              </a:defRPr>
+            </a:lvl1pPr>
+            <a:lvl2pPr marL="685800" indent="-336550" algn="l" defTabSz="914400" rtl="0" eaLnBrk="1" latinLnBrk="0" hangingPunct="1">
+              <a:spcBef>
+                <a:spcPts val="600"/>
+              </a:spcBef>
+              <a:buClr>
+                <a:schemeClr val="accent1">
+                  <a:lumMod val="75000"/>
+                </a:schemeClr>
+              </a:buClr>
+              <a:buSzPct val="110000"/>
+              <a:buFont typeface="Wingdings 2" pitchFamily="18" charset="2"/>
+              <a:buChar char=""/>
+              <a:defRPr sz="2200" kern="1200">
+                <a:solidFill>
+                  <a:schemeClr val="tx1">
+                    <a:lumMod val="65000"/>
+                    <a:lumOff val="35000"/>
+                  </a:schemeClr>
+                </a:solidFill>
+                <a:latin typeface="+mn-lt"/>
+                <a:ea typeface="+mn-ea"/>
+                <a:cs typeface="+mn-cs"/>
+              </a:defRPr>
+            </a:lvl2pPr>
+            <a:lvl3pPr marL="968375" indent="-282575" algn="l" defTabSz="914400" rtl="0" eaLnBrk="1" latinLnBrk="0" hangingPunct="1">
+              <a:spcBef>
+                <a:spcPts val="600"/>
+              </a:spcBef>
+              <a:buClr>
+                <a:schemeClr val="accent1">
+                  <a:lumMod val="60000"/>
+                  <a:lumOff val="40000"/>
+                </a:schemeClr>
+              </a:buClr>
+              <a:buSzPct val="110000"/>
+              <a:buFont typeface="Wingdings 2" pitchFamily="18" charset="2"/>
+              <a:buChar char=""/>
+              <a:defRPr sz="2000" kern="1200">
+                <a:solidFill>
+                  <a:schemeClr val="tx1">
+                    <a:lumMod val="65000"/>
+                    <a:lumOff val="35000"/>
+                  </a:schemeClr>
+                </a:solidFill>
+                <a:latin typeface="+mn-lt"/>
+                <a:ea typeface="+mn-ea"/>
+                <a:cs typeface="+mn-cs"/>
+              </a:defRPr>
+            </a:lvl3pPr>
+            <a:lvl4pPr marL="1263650" indent="-295275" algn="l" defTabSz="914400" rtl="0" eaLnBrk="1" latinLnBrk="0" hangingPunct="1">
+              <a:spcBef>
+                <a:spcPts val="600"/>
+              </a:spcBef>
+              <a:buClr>
+                <a:schemeClr val="accent1">
+                  <a:lumMod val="75000"/>
+                </a:schemeClr>
+              </a:buClr>
+              <a:buSzPct val="110000"/>
+              <a:buFont typeface="Wingdings 2" pitchFamily="18" charset="2"/>
+              <a:buChar char=""/>
+              <a:defRPr sz="1800" kern="1200">
+                <a:solidFill>
+                  <a:schemeClr val="tx1">
+                    <a:lumMod val="65000"/>
+                    <a:lumOff val="35000"/>
+                  </a:schemeClr>
+                </a:solidFill>
+                <a:latin typeface="+mn-lt"/>
+                <a:ea typeface="+mn-ea"/>
+                <a:cs typeface="+mn-cs"/>
+              </a:defRPr>
+            </a:lvl4pPr>
+            <a:lvl5pPr marL="1546225" indent="-282575" algn="l" defTabSz="914400" rtl="0" eaLnBrk="1" latinLnBrk="0" hangingPunct="1">
+              <a:spcBef>
+                <a:spcPts val="600"/>
+              </a:spcBef>
+              <a:buClr>
+                <a:schemeClr val="accent1">
+                  <a:lumMod val="60000"/>
+                  <a:lumOff val="40000"/>
+                </a:schemeClr>
+              </a:buClr>
+              <a:buSzPct val="110000"/>
+              <a:buFont typeface="Wingdings 2" pitchFamily="18" charset="2"/>
+              <a:buChar char=""/>
+              <a:defRPr sz="1800" kern="1200">
+                <a:solidFill>
+                  <a:schemeClr val="tx1">
+                    <a:lumMod val="65000"/>
+                    <a:lumOff val="35000"/>
+                  </a:schemeClr>
+                </a:solidFill>
+                <a:latin typeface="+mn-lt"/>
+                <a:ea typeface="+mn-ea"/>
+                <a:cs typeface="+mn-cs"/>
+              </a:defRPr>
+            </a:lvl5pPr>
+            <a:lvl6pPr marL="1828800" indent="-282575" algn="l" defTabSz="914400" rtl="0" eaLnBrk="1" latinLnBrk="0" hangingPunct="1">
+              <a:spcBef>
+                <a:spcPct val="20000"/>
+              </a:spcBef>
+              <a:buClr>
+                <a:schemeClr val="accent2"/>
+              </a:buClr>
+              <a:buSzPct val="110000"/>
+              <a:buFont typeface="Wingdings 2" pitchFamily="18" charset="2"/>
+              <a:buChar char=""/>
+              <a:defRPr lang="en-US" sz="1800" kern="1200" dirty="0" smtClean="0">
+                <a:solidFill>
+                  <a:schemeClr val="tx1">
+                    <a:lumMod val="65000"/>
+                    <a:lumOff val="35000"/>
+                  </a:schemeClr>
+                </a:solidFill>
+                <a:latin typeface="+mn-lt"/>
+                <a:ea typeface="+mn-ea"/>
+                <a:cs typeface="+mn-cs"/>
+              </a:defRPr>
+            </a:lvl6pPr>
+            <a:lvl7pPr marL="2117725" indent="-282575" algn="l" defTabSz="914400" rtl="0" eaLnBrk="1" latinLnBrk="0" hangingPunct="1">
+              <a:spcBef>
+                <a:spcPct val="20000"/>
+              </a:spcBef>
+              <a:buClr>
+                <a:schemeClr val="accent1">
+                  <a:lumMod val="60000"/>
+                  <a:lumOff val="40000"/>
+                </a:schemeClr>
+              </a:buClr>
+              <a:buSzPct val="110000"/>
+              <a:buFont typeface="Wingdings 2" pitchFamily="18" charset="2"/>
+              <a:buChar char=""/>
+              <a:defRPr lang="en-US" sz="1800" kern="1200" dirty="0" smtClean="0">
+                <a:solidFill>
+                  <a:schemeClr val="tx1">
+                    <a:lumMod val="65000"/>
+                    <a:lumOff val="35000"/>
+                  </a:schemeClr>
+                </a:solidFill>
+                <a:latin typeface="+mn-lt"/>
+                <a:ea typeface="+mn-ea"/>
+                <a:cs typeface="+mn-cs"/>
+              </a:defRPr>
+            </a:lvl7pPr>
+            <a:lvl8pPr marL="2398713" indent="-282575" algn="l" defTabSz="914400" rtl="0" eaLnBrk="1" latinLnBrk="0" hangingPunct="1">
+              <a:spcBef>
+                <a:spcPct val="20000"/>
+              </a:spcBef>
+              <a:buClr>
+                <a:schemeClr val="accent2"/>
+              </a:buClr>
+              <a:buSzPct val="110000"/>
+              <a:buFont typeface="Wingdings 2" pitchFamily="18" charset="2"/>
+              <a:buChar char=""/>
+              <a:defRPr lang="en-US" sz="1800" kern="1200" dirty="0" smtClean="0">
+                <a:solidFill>
+                  <a:schemeClr val="tx1">
+                    <a:lumMod val="65000"/>
+                    <a:lumOff val="35000"/>
+                  </a:schemeClr>
+                </a:solidFill>
+                <a:latin typeface="+mn-lt"/>
+                <a:ea typeface="+mn-ea"/>
+                <a:cs typeface="+mn-cs"/>
+              </a:defRPr>
+            </a:lvl8pPr>
+            <a:lvl9pPr marL="2689225" indent="-282575" algn="l" defTabSz="914400" rtl="0" eaLnBrk="1" latinLnBrk="0" hangingPunct="1">
+              <a:spcBef>
+                <a:spcPct val="20000"/>
+              </a:spcBef>
+              <a:buClr>
+                <a:schemeClr val="accent1">
+                  <a:lumMod val="60000"/>
+                  <a:lumOff val="40000"/>
+                </a:schemeClr>
+              </a:buClr>
+              <a:buSzPct val="110000"/>
+              <a:buFont typeface="Wingdings 2" pitchFamily="18" charset="2"/>
+              <a:buChar char=""/>
+              <a:defRPr lang="en-US" sz="1800" kern="1200" dirty="0">
+                <a:solidFill>
+                  <a:schemeClr val="tx1">
+                    <a:lumMod val="65000"/>
+                    <a:lumOff val="35000"/>
+                  </a:schemeClr>
+                </a:solidFill>
+                <a:latin typeface="+mn-lt"/>
+                <a:ea typeface="+mn-ea"/>
+                <a:cs typeface="+mn-cs"/>
+              </a:defRPr>
+            </a:lvl9pPr>
+          </a:lstStyle>
+          <a:p>
+            <a:r>
+              <a:rPr lang="en-US" dirty="0" smtClean="0"/>
+              <a:t>Login history</a:t>
+            </a:r>
+          </a:p>
+          <a:p>
+            <a:r>
+              <a:rPr lang="en-US" dirty="0" smtClean="0"/>
+              <a:t>Caching</a:t>
+            </a:r>
+          </a:p>
+          <a:p>
+            <a:r>
+              <a:rPr lang="en-US" dirty="0" smtClean="0"/>
+              <a:t>Better handling </a:t>
+            </a:r>
+            <a:br>
+              <a:rPr lang="en-US" dirty="0" smtClean="0"/>
+            </a:br>
+            <a:r>
+              <a:rPr lang="en-US" dirty="0" smtClean="0"/>
+              <a:t>of timestamps</a:t>
+            </a:r>
+          </a:p>
+          <a:p>
+            <a:r>
+              <a:rPr lang="en-US" dirty="0" smtClean="0"/>
+              <a:t>Auto LIMIT</a:t>
+            </a:r>
+            <a:endParaRPr lang="en-US" dirty="0"/>
           </a:p>
         </p:txBody>
       </p:sp>
     </p:spTree>
     <p:extLst>
       <p:ext uri="{BB962C8B-B14F-4D97-AF65-F5344CB8AC3E}">
-        <p14:creationId xmlns:p14="http://schemas.microsoft.com/office/powerpoint/2010/main" val="3082404529"/>
+        <p14:creationId xmlns:p14="http://schemas.microsoft.com/office/powerpoint/2010/main" val="2331899560"/>
       </p:ext>
     </p:extLst>
   </p:cSld>
@@ -4082,6 +5342,74 @@
     </p:spTree>
     <p:extLst>
       <p:ext uri="{BB962C8B-B14F-4D97-AF65-F5344CB8AC3E}">
+        <p14:creationId xmlns:p14="http://schemas.microsoft.com/office/powerpoint/2010/main" val="3082404529"/>
+      </p:ext>
+    </p:extLst>
+  </p:cSld>
+  <p:clrMapOvr>
+    <a:masterClrMapping/>
+  </p:clrMapOvr>
+</p:sld>
+</file>
+
+<file path=ppt/slides/slide6.xml><?xml version="1.0" encoding="utf-8"?>
+<p:sld xmlns:a="http://schemas.openxmlformats.org/drawingml/2006/main" xmlns:r="http://schemas.openxmlformats.org/officeDocument/2006/relationships" xmlns:p="http://schemas.openxmlformats.org/presentationml/2006/main">
+  <p:cSld>
+    <p:spTree>
+      <p:nvGrpSpPr>
+        <p:cNvPr id="1" name=""/>
+        <p:cNvGrpSpPr/>
+        <p:nvPr/>
+      </p:nvGrpSpPr>
+      <p:grpSpPr>
+        <a:xfrm>
+          <a:off x="0" y="0"/>
+          <a:ext cx="0" cy="0"/>
+          <a:chOff x="0" y="0"/>
+          <a:chExt cx="0" cy="0"/>
+        </a:xfrm>
+      </p:grpSpPr>
+      <p:sp>
+        <p:nvSpPr>
+          <p:cNvPr id="2" name="Title 1"/>
+          <p:cNvSpPr>
+            <a:spLocks noGrp="1"/>
+          </p:cNvSpPr>
+          <p:nvPr>
+            <p:ph type="title"/>
+          </p:nvPr>
+        </p:nvSpPr>
+        <p:spPr/>
+        <p:txBody>
+          <a:bodyPr/>
+          <a:lstStyle/>
+          <a:p>
+            <a:endParaRPr lang="en-US"/>
+          </a:p>
+        </p:txBody>
+      </p:sp>
+      <p:sp>
+        <p:nvSpPr>
+          <p:cNvPr id="3" name="Content Placeholder 2"/>
+          <p:cNvSpPr>
+            <a:spLocks noGrp="1"/>
+          </p:cNvSpPr>
+          <p:nvPr>
+            <p:ph idx="1"/>
+          </p:nvPr>
+        </p:nvSpPr>
+        <p:spPr/>
+        <p:txBody>
+          <a:bodyPr/>
+          <a:lstStyle/>
+          <a:p>
+            <a:endParaRPr lang="en-US"/>
+          </a:p>
+        </p:txBody>
+      </p:sp>
+    </p:spTree>
+    <p:extLst>
+      <p:ext uri="{BB962C8B-B14F-4D97-AF65-F5344CB8AC3E}">
         <p14:creationId xmlns:p14="http://schemas.microsoft.com/office/powerpoint/2010/main" val="1179357605"/>
       </p:ext>
     </p:extLst>
@@ -4092,7 +5420,7 @@
 </p:sld>
 </file>
 
-<file path=ppt/slides/slide6.xml><?xml version="1.0" encoding="utf-8"?>
+<file path=ppt/slides/slide7.xml><?xml version="1.0" encoding="utf-8"?>
 <p:sld xmlns:a="http://schemas.openxmlformats.org/drawingml/2006/main" xmlns:r="http://schemas.openxmlformats.org/officeDocument/2006/relationships" xmlns:p="http://schemas.openxmlformats.org/presentationml/2006/main">
   <p:cSld>
     <p:spTree>
@@ -4426,6 +5754,326 @@
 </a:theme>
 </file>
 
+<file path=ppt/theme/theme2.xml><?xml version="1.0" encoding="utf-8"?>
+<a:theme xmlns:a="http://schemas.openxmlformats.org/drawingml/2006/main" name="Office Theme">
+  <a:themeElements>
+    <a:clrScheme name="Office">
+      <a:dk1>
+        <a:sysClr val="windowText" lastClr="000000"/>
+      </a:dk1>
+      <a:lt1>
+        <a:sysClr val="window" lastClr="FFFFFF"/>
+      </a:lt1>
+      <a:dk2>
+        <a:srgbClr val="1F497D"/>
+      </a:dk2>
+      <a:lt2>
+        <a:srgbClr val="EEECE1"/>
+      </a:lt2>
+      <a:accent1>
+        <a:srgbClr val="4F81BD"/>
+      </a:accent1>
+      <a:accent2>
+        <a:srgbClr val="C0504D"/>
+      </a:accent2>
+      <a:accent3>
+        <a:srgbClr val="9BBB59"/>
+      </a:accent3>
+      <a:accent4>
+        <a:srgbClr val="8064A2"/>
+      </a:accent4>
+      <a:accent5>
+        <a:srgbClr val="4BACC6"/>
+      </a:accent5>
+      <a:accent6>
+        <a:srgbClr val="F79646"/>
+      </a:accent6>
+      <a:hlink>
+        <a:srgbClr val="0000FF"/>
+      </a:hlink>
+      <a:folHlink>
+        <a:srgbClr val="800080"/>
+      </a:folHlink>
+    </a:clrScheme>
+    <a:fontScheme name="Office">
+      <a:majorFont>
+        <a:latin typeface="Calibri"/>
+        <a:ea typeface=""/>
+        <a:cs typeface=""/>
+        <a:font script="Jpan" typeface="ＭＳ Ｐゴシック"/>
+        <a:font script="Hang" typeface="맑은 고딕"/>
+        <a:font script="Hans" typeface="宋体"/>
+        <a:font script="Hant" typeface="新細明體"/>
+        <a:font script="Arab" typeface="Times New Roman"/>
+        <a:font script="Hebr" typeface="Times New Roman"/>
+        <a:font script="Thai" typeface="Angsana New"/>
+        <a:font script="Ethi" typeface="Nyala"/>
+        <a:font script="Beng" typeface="Vrinda"/>
+        <a:font script="Gujr" typeface="Shruti"/>
+        <a:font script="Khmr" typeface="MoolBoran"/>
+        <a:font script="Knda" typeface="Tunga"/>
+        <a:font script="Guru" typeface="Raavi"/>
+        <a:font script="Cans" typeface="Euphemia"/>
+        <a:font script="Cher" typeface="Plantagenet Cherokee"/>
+        <a:font script="Yiii" typeface="Microsoft Yi Baiti"/>
+        <a:font script="Tibt" typeface="Microsoft Himalaya"/>
+        <a:font script="Thaa" typeface="MV Boli"/>
+        <a:font script="Deva" typeface="Mangal"/>
+        <a:font script="Telu" typeface="Gautami"/>
+        <a:font script="Taml" typeface="Latha"/>
+        <a:font script="Syrc" typeface="Estrangelo Edessa"/>
+        <a:font script="Orya" typeface="Kalinga"/>
+        <a:font script="Mlym" typeface="Kartika"/>
+        <a:font script="Laoo" typeface="DokChampa"/>
+        <a:font script="Sinh" typeface="Iskoola Pota"/>
+        <a:font script="Mong" typeface="Mongolian Baiti"/>
+        <a:font script="Viet" typeface="Times New Roman"/>
+        <a:font script="Uigh" typeface="Microsoft Uighur"/>
+        <a:font script="Geor" typeface="Sylfaen"/>
+      </a:majorFont>
+      <a:minorFont>
+        <a:latin typeface="Calibri"/>
+        <a:ea typeface=""/>
+        <a:cs typeface=""/>
+        <a:font script="Jpan" typeface="ＭＳ Ｐゴシック"/>
+        <a:font script="Hang" typeface="맑은 고딕"/>
+        <a:font script="Hans" typeface="宋体"/>
+        <a:font script="Hant" typeface="新細明體"/>
+        <a:font script="Arab" typeface="Arial"/>
+        <a:font script="Hebr" typeface="Arial"/>
+        <a:font script="Thai" typeface="Cordia New"/>
+        <a:font script="Ethi" typeface="Nyala"/>
+        <a:font script="Beng" typeface="Vrinda"/>
+        <a:font script="Gujr" typeface="Shruti"/>
+        <a:font script="Khmr" typeface="DaunPenh"/>
+        <a:font script="Knda" typeface="Tunga"/>
+        <a:font script="Guru" typeface="Raavi"/>
+        <a:font script="Cans" typeface="Euphemia"/>
+        <a:font script="Cher" typeface="Plantagenet Cherokee"/>
+        <a:font script="Yiii" typeface="Microsoft Yi Baiti"/>
+        <a:font script="Tibt" typeface="Microsoft Himalaya"/>
+        <a:font script="Thaa" typeface="MV Boli"/>
+        <a:font script="Deva" typeface="Mangal"/>
+        <a:font script="Telu" typeface="Gautami"/>
+        <a:font script="Taml" typeface="Latha"/>
+        <a:font script="Syrc" typeface="Estrangelo Edessa"/>
+        <a:font script="Orya" typeface="Kalinga"/>
+        <a:font script="Mlym" typeface="Kartika"/>
+        <a:font script="Laoo" typeface="DokChampa"/>
+        <a:font script="Sinh" typeface="Iskoola Pota"/>
+        <a:font script="Mong" typeface="Mongolian Baiti"/>
+        <a:font script="Viet" typeface="Arial"/>
+        <a:font script="Uigh" typeface="Microsoft Uighur"/>
+        <a:font script="Geor" typeface="Sylfaen"/>
+      </a:minorFont>
+    </a:fontScheme>
+    <a:fmtScheme name="Office">
+      <a:fillStyleLst>
+        <a:solidFill>
+          <a:schemeClr val="phClr"/>
+        </a:solidFill>
+        <a:gradFill rotWithShape="1">
+          <a:gsLst>
+            <a:gs pos="0">
+              <a:schemeClr val="phClr">
+                <a:tint val="50000"/>
+                <a:satMod val="300000"/>
+              </a:schemeClr>
+            </a:gs>
+            <a:gs pos="35000">
+              <a:schemeClr val="phClr">
+                <a:tint val="37000"/>
+                <a:satMod val="300000"/>
+              </a:schemeClr>
+            </a:gs>
+            <a:gs pos="100000">
+              <a:schemeClr val="phClr">
+                <a:tint val="15000"/>
+                <a:satMod val="350000"/>
+              </a:schemeClr>
+            </a:gs>
+          </a:gsLst>
+          <a:lin ang="16200000" scaled="1"/>
+        </a:gradFill>
+        <a:gradFill rotWithShape="1">
+          <a:gsLst>
+            <a:gs pos="0">
+              <a:schemeClr val="phClr">
+                <a:tint val="100000"/>
+                <a:shade val="100000"/>
+                <a:satMod val="130000"/>
+              </a:schemeClr>
+            </a:gs>
+            <a:gs pos="100000">
+              <a:schemeClr val="phClr">
+                <a:tint val="50000"/>
+                <a:shade val="100000"/>
+                <a:satMod val="350000"/>
+              </a:schemeClr>
+            </a:gs>
+          </a:gsLst>
+          <a:lin ang="16200000" scaled="0"/>
+        </a:gradFill>
+      </a:fillStyleLst>
+      <a:lnStyleLst>
+        <a:ln w="9525" cap="flat" cmpd="sng" algn="ctr">
+          <a:solidFill>
+            <a:schemeClr val="phClr">
+              <a:shade val="95000"/>
+              <a:satMod val="105000"/>
+            </a:schemeClr>
+          </a:solidFill>
+          <a:prstDash val="solid"/>
+        </a:ln>
+        <a:ln w="25400" cap="flat" cmpd="sng" algn="ctr">
+          <a:solidFill>
+            <a:schemeClr val="phClr"/>
+          </a:solidFill>
+          <a:prstDash val="solid"/>
+        </a:ln>
+        <a:ln w="38100" cap="flat" cmpd="sng" algn="ctr">
+          <a:solidFill>
+            <a:schemeClr val="phClr"/>
+          </a:solidFill>
+          <a:prstDash val="solid"/>
+        </a:ln>
+      </a:lnStyleLst>
+      <a:effectStyleLst>
+        <a:effectStyle>
+          <a:effectLst>
+            <a:outerShdw blurRad="40000" dist="20000" dir="5400000" rotWithShape="0">
+              <a:srgbClr val="000000">
+                <a:alpha val="38000"/>
+              </a:srgbClr>
+            </a:outerShdw>
+          </a:effectLst>
+        </a:effectStyle>
+        <a:effectStyle>
+          <a:effectLst>
+            <a:outerShdw blurRad="40000" dist="23000" dir="5400000" rotWithShape="0">
+              <a:srgbClr val="000000">
+                <a:alpha val="35000"/>
+              </a:srgbClr>
+            </a:outerShdw>
+          </a:effectLst>
+        </a:effectStyle>
+        <a:effectStyle>
+          <a:effectLst>
+            <a:outerShdw blurRad="40000" dist="23000" dir="5400000" rotWithShape="0">
+              <a:srgbClr val="000000">
+                <a:alpha val="35000"/>
+              </a:srgbClr>
+            </a:outerShdw>
+          </a:effectLst>
+          <a:scene3d>
+            <a:camera prst="orthographicFront">
+              <a:rot lat="0" lon="0" rev="0"/>
+            </a:camera>
+            <a:lightRig rig="threePt" dir="t">
+              <a:rot lat="0" lon="0" rev="1200000"/>
+            </a:lightRig>
+          </a:scene3d>
+          <a:sp3d>
+            <a:bevelT w="63500" h="25400"/>
+          </a:sp3d>
+        </a:effectStyle>
+      </a:effectStyleLst>
+      <a:bgFillStyleLst>
+        <a:solidFill>
+          <a:schemeClr val="phClr"/>
+        </a:solidFill>
+        <a:gradFill rotWithShape="1">
+          <a:gsLst>
+            <a:gs pos="0">
+              <a:schemeClr val="phClr">
+                <a:tint val="40000"/>
+                <a:satMod val="350000"/>
+              </a:schemeClr>
+            </a:gs>
+            <a:gs pos="40000">
+              <a:schemeClr val="phClr">
+                <a:tint val="45000"/>
+                <a:shade val="99000"/>
+                <a:satMod val="350000"/>
+              </a:schemeClr>
+            </a:gs>
+            <a:gs pos="100000">
+              <a:schemeClr val="phClr">
+                <a:shade val="20000"/>
+                <a:satMod val="255000"/>
+              </a:schemeClr>
+            </a:gs>
+          </a:gsLst>
+          <a:path path="circle">
+            <a:fillToRect l="50000" t="-80000" r="50000" b="180000"/>
+          </a:path>
+        </a:gradFill>
+        <a:gradFill rotWithShape="1">
+          <a:gsLst>
+            <a:gs pos="0">
+              <a:schemeClr val="phClr">
+                <a:tint val="80000"/>
+                <a:satMod val="300000"/>
+              </a:schemeClr>
+            </a:gs>
+            <a:gs pos="100000">
+              <a:schemeClr val="phClr">
+                <a:shade val="30000"/>
+                <a:satMod val="200000"/>
+              </a:schemeClr>
+            </a:gs>
+          </a:gsLst>
+          <a:path path="circle">
+            <a:fillToRect l="50000" t="50000" r="50000" b="50000"/>
+          </a:path>
+        </a:gradFill>
+      </a:bgFillStyleLst>
+    </a:fmtScheme>
+  </a:themeElements>
+  <a:objectDefaults>
+    <a:spDef>
+      <a:spPr/>
+      <a:bodyPr/>
+      <a:lstStyle/>
+      <a:style>
+        <a:lnRef idx="1">
+          <a:schemeClr val="accent1"/>
+        </a:lnRef>
+        <a:fillRef idx="3">
+          <a:schemeClr val="accent1"/>
+        </a:fillRef>
+        <a:effectRef idx="2">
+          <a:schemeClr val="accent1"/>
+        </a:effectRef>
+        <a:fontRef idx="minor">
+          <a:schemeClr val="lt1"/>
+        </a:fontRef>
+      </a:style>
+    </a:spDef>
+    <a:lnDef>
+      <a:spPr/>
+      <a:bodyPr/>
+      <a:lstStyle/>
+      <a:style>
+        <a:lnRef idx="2">
+          <a:schemeClr val="accent1"/>
+        </a:lnRef>
+        <a:fillRef idx="0">
+          <a:schemeClr val="accent1"/>
+        </a:fillRef>
+        <a:effectRef idx="1">
+          <a:schemeClr val="accent1"/>
+        </a:effectRef>
+        <a:fontRef idx="minor">
+          <a:schemeClr val="tx1"/>
+        </a:fontRef>
+      </a:style>
+    </a:lnDef>
+  </a:objectDefaults>
+  <a:extraClrSchemeLst/>
+</a:theme>
+</file>
+
 <file path=customXml/item1.xml><?xml version="1.0" encoding="utf-8"?>
 <ct:contentTypeSchema xmlns:ct="http://schemas.microsoft.com/office/2006/metadata/contentType" xmlns:ma="http://schemas.microsoft.com/office/2006/metadata/properties/metaAttributes" ct:_="" ma:_="" ma:contentTypeName="Document" ma:contentTypeID="0x0101000DE64AEEDD9B7A4D93545ACBE97D4615" ma:contentTypeVersion="2" ma:contentTypeDescription="Create a new document." ma:contentTypeScope="" ma:versionID="f49002b78e3a4a71b814eef46a983816">
   <xsd:schema xmlns:xsd="http://www.w3.org/2001/XMLSchema" xmlns:xs="http://www.w3.org/2001/XMLSchema" xmlns:p="http://schemas.microsoft.com/office/2006/metadata/properties" xmlns:ns2="http://schemas.microsoft.com/sharepoint/v3/fields" targetNamespace="http://schemas.microsoft.com/office/2006/metadata/properties" ma:root="true" ma:fieldsID="38f6db2dd0d9a0cf6a8dc37be32b365b" ns2:_="">

</xml_diff>

<commit_message>
all good things on one page each
</commit_message>
<xml_diff>
--- a/adminfluxdb.pptx
+++ b/adminfluxdb.pptx
@@ -5,7 +5,7 @@
     <p:sldMasterId id="2147493467" r:id="rId4"/>
   </p:sldMasterIdLst>
   <p:notesMasterIdLst>
-    <p:notesMasterId r:id="rId12"/>
+    <p:notesMasterId r:id="rId18"/>
   </p:notesMasterIdLst>
   <p:sldIdLst>
     <p:sldId id="256" r:id="rId5"/>
@@ -13,8 +13,14 @@
     <p:sldId id="262" r:id="rId7"/>
     <p:sldId id="259" r:id="rId8"/>
     <p:sldId id="258" r:id="rId9"/>
-    <p:sldId id="260" r:id="rId10"/>
-    <p:sldId id="261" r:id="rId11"/>
+    <p:sldId id="263" r:id="rId10"/>
+    <p:sldId id="264" r:id="rId11"/>
+    <p:sldId id="265" r:id="rId12"/>
+    <p:sldId id="266" r:id="rId13"/>
+    <p:sldId id="267" r:id="rId14"/>
+    <p:sldId id="268" r:id="rId15"/>
+    <p:sldId id="269" r:id="rId16"/>
+    <p:sldId id="270" r:id="rId17"/>
   </p:sldIdLst>
   <p:sldSz cx="9144000" cy="5143500" type="screen16x9"/>
   <p:notesSz cx="6858000" cy="9144000"/>
@@ -573,6 +579,262 @@
 </p:notes>
 </file>
 
+<file path=ppt/notesSlides/notesSlide10.xml><?xml version="1.0" encoding="utf-8"?>
+<p:notes xmlns:a="http://schemas.openxmlformats.org/drawingml/2006/main" xmlns:r="http://schemas.openxmlformats.org/officeDocument/2006/relationships" xmlns:p="http://schemas.openxmlformats.org/presentationml/2006/main">
+  <p:cSld>
+    <p:spTree>
+      <p:nvGrpSpPr>
+        <p:cNvPr id="1" name=""/>
+        <p:cNvGrpSpPr/>
+        <p:nvPr/>
+      </p:nvGrpSpPr>
+      <p:grpSpPr>
+        <a:xfrm>
+          <a:off x="0" y="0"/>
+          <a:ext cx="0" cy="0"/>
+          <a:chOff x="0" y="0"/>
+          <a:chExt cx="0" cy="0"/>
+        </a:xfrm>
+      </p:grpSpPr>
+      <p:sp>
+        <p:nvSpPr>
+          <p:cNvPr id="2" name="Slide Image Placeholder 1"/>
+          <p:cNvSpPr>
+            <a:spLocks noGrp="1" noRot="1" noChangeAspect="1"/>
+          </p:cNvSpPr>
+          <p:nvPr>
+            <p:ph type="sldImg"/>
+          </p:nvPr>
+        </p:nvSpPr>
+        <p:spPr/>
+      </p:sp>
+      <p:sp>
+        <p:nvSpPr>
+          <p:cNvPr id="3" name="Notes Placeholder 2"/>
+          <p:cNvSpPr>
+            <a:spLocks noGrp="1"/>
+          </p:cNvSpPr>
+          <p:nvPr>
+            <p:ph type="body" idx="1"/>
+          </p:nvPr>
+        </p:nvSpPr>
+        <p:spPr/>
+        <p:txBody>
+          <a:bodyPr/>
+          <a:lstStyle/>
+          <a:p>
+            <a:r>
+              <a:rPr lang="en-US" dirty="0" smtClean="0"/>
+              <a:t>Pagination! You can now pull 2 million data points in one query and browse them page for page, because the tool stores the full result in the webserver, not in the client</a:t>
+            </a:r>
+          </a:p>
+          <a:p>
+            <a:endParaRPr lang="en-US" dirty="0" smtClean="0"/>
+          </a:p>
+          <a:p>
+            <a:r>
+              <a:rPr lang="en-US" dirty="0" smtClean="0"/>
+              <a:t>Caching. The tool caches the results for a couple of minutes so that you can re-use them without having to wait for the database. You can of course also tell it to get fresh data instead.</a:t>
+            </a:r>
+          </a:p>
+          <a:p>
+            <a:endParaRPr lang="en-US" dirty="0" smtClean="0"/>
+          </a:p>
+          <a:p>
+            <a:r>
+              <a:rPr lang="en-US" dirty="0" smtClean="0"/>
+              <a:t>Better handling of timestamps: they are displayed in both the internal and a human readable format</a:t>
+            </a:r>
+          </a:p>
+          <a:p>
+            <a:endParaRPr lang="en-US" dirty="0" smtClean="0"/>
+          </a:p>
+          <a:p>
+            <a:r>
+              <a:rPr lang="en-US" dirty="0" smtClean="0"/>
+              <a:t>Auto limit. If you run a select query against the database and forget to add a limit clause, the tool will add it for you, so that you don't kill the database.</a:t>
+            </a:r>
+          </a:p>
+          <a:p>
+            <a:pPr algn="ctr"/>
+            <a:endParaRPr lang="en-US" dirty="0" smtClean="0"/>
+          </a:p>
+          <a:p>
+            <a:pPr algn="ctr"/>
+            <a:r>
+              <a:rPr lang="en-US" dirty="0" smtClean="0"/>
+              <a:t>No administrative stuff like user management or database creation</a:t>
+            </a:r>
+          </a:p>
+          <a:p>
+            <a:endParaRPr lang="en-US" dirty="0"/>
+          </a:p>
+        </p:txBody>
+      </p:sp>
+      <p:sp>
+        <p:nvSpPr>
+          <p:cNvPr id="4" name="Slide Number Placeholder 3"/>
+          <p:cNvSpPr>
+            <a:spLocks noGrp="1"/>
+          </p:cNvSpPr>
+          <p:nvPr>
+            <p:ph type="sldNum" sz="quarter" idx="10"/>
+          </p:nvPr>
+        </p:nvSpPr>
+        <p:spPr/>
+        <p:txBody>
+          <a:bodyPr/>
+          <a:lstStyle/>
+          <a:p>
+            <a:fld id="{8F02F506-0DE5-BF4F-9118-E0A27549203C}" type="slidenum">
+              <a:rPr lang="en-US" smtClean="0"/>
+              <a:t>12</a:t>
+            </a:fld>
+            <a:endParaRPr lang="en-US"/>
+          </a:p>
+        </p:txBody>
+      </p:sp>
+    </p:spTree>
+    <p:extLst>
+      <p:ext uri="{BB962C8B-B14F-4D97-AF65-F5344CB8AC3E}">
+        <p14:creationId xmlns:p14="http://schemas.microsoft.com/office/powerpoint/2010/main" val="2719542430"/>
+      </p:ext>
+    </p:extLst>
+  </p:cSld>
+  <p:clrMapOvr>
+    <a:masterClrMapping/>
+  </p:clrMapOvr>
+</p:notes>
+</file>
+
+<file path=ppt/notesSlides/notesSlide11.xml><?xml version="1.0" encoding="utf-8"?>
+<p:notes xmlns:a="http://schemas.openxmlformats.org/drawingml/2006/main" xmlns:r="http://schemas.openxmlformats.org/officeDocument/2006/relationships" xmlns:p="http://schemas.openxmlformats.org/presentationml/2006/main">
+  <p:cSld>
+    <p:spTree>
+      <p:nvGrpSpPr>
+        <p:cNvPr id="1" name=""/>
+        <p:cNvGrpSpPr/>
+        <p:nvPr/>
+      </p:nvGrpSpPr>
+      <p:grpSpPr>
+        <a:xfrm>
+          <a:off x="0" y="0"/>
+          <a:ext cx="0" cy="0"/>
+          <a:chOff x="0" y="0"/>
+          <a:chExt cx="0" cy="0"/>
+        </a:xfrm>
+      </p:grpSpPr>
+      <p:sp>
+        <p:nvSpPr>
+          <p:cNvPr id="2" name="Slide Image Placeholder 1"/>
+          <p:cNvSpPr>
+            <a:spLocks noGrp="1" noRot="1" noChangeAspect="1"/>
+          </p:cNvSpPr>
+          <p:nvPr>
+            <p:ph type="sldImg"/>
+          </p:nvPr>
+        </p:nvSpPr>
+        <p:spPr/>
+      </p:sp>
+      <p:sp>
+        <p:nvSpPr>
+          <p:cNvPr id="3" name="Notes Placeholder 2"/>
+          <p:cNvSpPr>
+            <a:spLocks noGrp="1"/>
+          </p:cNvSpPr>
+          <p:nvPr>
+            <p:ph type="body" idx="1"/>
+          </p:nvPr>
+        </p:nvSpPr>
+        <p:spPr/>
+        <p:txBody>
+          <a:bodyPr/>
+          <a:lstStyle/>
+          <a:p>
+            <a:r>
+              <a:rPr lang="en-US" dirty="0" smtClean="0"/>
+              <a:t>Pagination! You can now pull 2 million data points in one query and browse them page for page, because the tool stores the full result in the webserver, not in the client</a:t>
+            </a:r>
+          </a:p>
+          <a:p>
+            <a:endParaRPr lang="en-US" dirty="0" smtClean="0"/>
+          </a:p>
+          <a:p>
+            <a:r>
+              <a:rPr lang="en-US" dirty="0" smtClean="0"/>
+              <a:t>Caching. The tool caches the results for a couple of minutes so that you can re-use them without having to wait for the database. You can of course also tell it to get fresh data instead.</a:t>
+            </a:r>
+          </a:p>
+          <a:p>
+            <a:endParaRPr lang="en-US" dirty="0" smtClean="0"/>
+          </a:p>
+          <a:p>
+            <a:r>
+              <a:rPr lang="en-US" dirty="0" smtClean="0"/>
+              <a:t>Better handling of timestamps: they are displayed in both the internal and a human readable format</a:t>
+            </a:r>
+          </a:p>
+          <a:p>
+            <a:endParaRPr lang="en-US" dirty="0" smtClean="0"/>
+          </a:p>
+          <a:p>
+            <a:r>
+              <a:rPr lang="en-US" dirty="0" smtClean="0"/>
+              <a:t>Auto limit. If you run a select query against the database and forget to add a limit clause, the tool will add it for you, so that you don't kill the database.</a:t>
+            </a:r>
+          </a:p>
+          <a:p>
+            <a:pPr algn="ctr"/>
+            <a:endParaRPr lang="en-US" dirty="0" smtClean="0"/>
+          </a:p>
+          <a:p>
+            <a:pPr algn="ctr"/>
+            <a:r>
+              <a:rPr lang="en-US" dirty="0" smtClean="0"/>
+              <a:t>No administrative stuff like user management or database creation</a:t>
+            </a:r>
+          </a:p>
+          <a:p>
+            <a:endParaRPr lang="en-US" dirty="0"/>
+          </a:p>
+        </p:txBody>
+      </p:sp>
+      <p:sp>
+        <p:nvSpPr>
+          <p:cNvPr id="4" name="Slide Number Placeholder 3"/>
+          <p:cNvSpPr>
+            <a:spLocks noGrp="1"/>
+          </p:cNvSpPr>
+          <p:nvPr>
+            <p:ph type="sldNum" sz="quarter" idx="10"/>
+          </p:nvPr>
+        </p:nvSpPr>
+        <p:spPr/>
+        <p:txBody>
+          <a:bodyPr/>
+          <a:lstStyle/>
+          <a:p>
+            <a:fld id="{8F02F506-0DE5-BF4F-9118-E0A27549203C}" type="slidenum">
+              <a:rPr lang="en-US" smtClean="0"/>
+              <a:t>13</a:t>
+            </a:fld>
+            <a:endParaRPr lang="en-US"/>
+          </a:p>
+        </p:txBody>
+      </p:sp>
+    </p:spTree>
+    <p:extLst>
+      <p:ext uri="{BB962C8B-B14F-4D97-AF65-F5344CB8AC3E}">
+        <p14:creationId xmlns:p14="http://schemas.microsoft.com/office/powerpoint/2010/main" val="2719542430"/>
+      </p:ext>
+    </p:extLst>
+  </p:cSld>
+  <p:clrMapOvr>
+    <a:masterClrMapping/>
+  </p:clrMapOvr>
+</p:notes>
+</file>
+
 <file path=ppt/notesSlides/notesSlide2.xml><?xml version="1.0" encoding="utf-8"?>
 <p:notes xmlns:a="http://schemas.openxmlformats.org/drawingml/2006/main" xmlns:r="http://schemas.openxmlformats.org/officeDocument/2006/relationships" xmlns:p="http://schemas.openxmlformats.org/presentationml/2006/main">
   <p:cSld>
@@ -712,43 +974,6 @@
           <a:bodyPr/>
           <a:lstStyle/>
           <a:p>
-            <a:r>
-              <a:rPr lang="en-US" dirty="0" smtClean="0"/>
-              <a:t>Pagination! You can now pull 2 million data points in one query and browse them page for page, because the tool stores the full result in the webserver, not in the client</a:t>
-            </a:r>
-          </a:p>
-          <a:p>
-            <a:endParaRPr lang="en-US" dirty="0" smtClean="0"/>
-          </a:p>
-          <a:p>
-            <a:r>
-              <a:rPr lang="en-US" dirty="0" smtClean="0"/>
-              <a:t>Caching. The tool caches the results for a couple of minutes so that you can re-use them without having to wait for the database. You can of course also tell it to get fresh data instead.</a:t>
-            </a:r>
-          </a:p>
-          <a:p>
-            <a:endParaRPr lang="en-US" dirty="0" smtClean="0"/>
-          </a:p>
-          <a:p>
-            <a:r>
-              <a:rPr lang="en-US" dirty="0" smtClean="0"/>
-              <a:t>Better handling of timestamps: they are displayed in both the internal and a human readable format</a:t>
-            </a:r>
-          </a:p>
-          <a:p>
-            <a:endParaRPr lang="en-US" dirty="0" smtClean="0"/>
-          </a:p>
-          <a:p>
-            <a:r>
-              <a:rPr lang="en-US" dirty="0" smtClean="0"/>
-              <a:t>Auto limit. If you run a select query against the database and forget to add a limit clause, the tool will add it for you, so that you don't kill the database.</a:t>
-            </a:r>
-          </a:p>
-          <a:p>
-            <a:pPr algn="ctr"/>
-            <a:endParaRPr lang="en-US" dirty="0" smtClean="0"/>
-          </a:p>
-          <a:p>
             <a:pPr algn="ctr"/>
             <a:r>
               <a:rPr lang="en-US" dirty="0" smtClean="0"/>
@@ -778,6 +1003,774 @@
             <a:fld id="{8F02F506-0DE5-BF4F-9118-E0A27549203C}" type="slidenum">
               <a:rPr lang="en-US" smtClean="0"/>
               <a:t>5</a:t>
+            </a:fld>
+            <a:endParaRPr lang="en-US"/>
+          </a:p>
+        </p:txBody>
+      </p:sp>
+    </p:spTree>
+    <p:extLst>
+      <p:ext uri="{BB962C8B-B14F-4D97-AF65-F5344CB8AC3E}">
+        <p14:creationId xmlns:p14="http://schemas.microsoft.com/office/powerpoint/2010/main" val="2719542430"/>
+      </p:ext>
+    </p:extLst>
+  </p:cSld>
+  <p:clrMapOvr>
+    <a:masterClrMapping/>
+  </p:clrMapOvr>
+</p:notes>
+</file>
+
+<file path=ppt/notesSlides/notesSlide4.xml><?xml version="1.0" encoding="utf-8"?>
+<p:notes xmlns:a="http://schemas.openxmlformats.org/drawingml/2006/main" xmlns:r="http://schemas.openxmlformats.org/officeDocument/2006/relationships" xmlns:p="http://schemas.openxmlformats.org/presentationml/2006/main">
+  <p:cSld>
+    <p:spTree>
+      <p:nvGrpSpPr>
+        <p:cNvPr id="1" name=""/>
+        <p:cNvGrpSpPr/>
+        <p:nvPr/>
+      </p:nvGrpSpPr>
+      <p:grpSpPr>
+        <a:xfrm>
+          <a:off x="0" y="0"/>
+          <a:ext cx="0" cy="0"/>
+          <a:chOff x="0" y="0"/>
+          <a:chExt cx="0" cy="0"/>
+        </a:xfrm>
+      </p:grpSpPr>
+      <p:sp>
+        <p:nvSpPr>
+          <p:cNvPr id="2" name="Slide Image Placeholder 1"/>
+          <p:cNvSpPr>
+            <a:spLocks noGrp="1" noRot="1" noChangeAspect="1"/>
+          </p:cNvSpPr>
+          <p:nvPr>
+            <p:ph type="sldImg"/>
+          </p:nvPr>
+        </p:nvSpPr>
+        <p:spPr/>
+      </p:sp>
+      <p:sp>
+        <p:nvSpPr>
+          <p:cNvPr id="3" name="Notes Placeholder 2"/>
+          <p:cNvSpPr>
+            <a:spLocks noGrp="1"/>
+          </p:cNvSpPr>
+          <p:nvPr>
+            <p:ph type="body" idx="1"/>
+          </p:nvPr>
+        </p:nvSpPr>
+        <p:spPr/>
+        <p:txBody>
+          <a:bodyPr/>
+          <a:lstStyle/>
+          <a:p>
+            <a:r>
+              <a:rPr lang="en-US" dirty="0" smtClean="0"/>
+              <a:t>Pagination! You can now pull 2 million data points in one query and browse them page for page, because the tool stores the full result in the webserver, not in the client</a:t>
+            </a:r>
+          </a:p>
+          <a:p>
+            <a:endParaRPr lang="en-US" dirty="0" smtClean="0"/>
+          </a:p>
+          <a:p>
+            <a:r>
+              <a:rPr lang="en-US" dirty="0" smtClean="0"/>
+              <a:t>Caching. The tool caches the results for a couple of minutes so that you can re-use them without having to wait for the database. You can of course also tell it to get fresh data instead.</a:t>
+            </a:r>
+          </a:p>
+          <a:p>
+            <a:endParaRPr lang="en-US" dirty="0" smtClean="0"/>
+          </a:p>
+          <a:p>
+            <a:r>
+              <a:rPr lang="en-US" dirty="0" smtClean="0"/>
+              <a:t>Better handling of timestamps: they are displayed in both the internal and a human readable format</a:t>
+            </a:r>
+          </a:p>
+          <a:p>
+            <a:endParaRPr lang="en-US" dirty="0" smtClean="0"/>
+          </a:p>
+          <a:p>
+            <a:r>
+              <a:rPr lang="en-US" dirty="0" smtClean="0"/>
+              <a:t>Auto limit. If you run a select query against the database and forget to add a limit clause, the tool will add it for you, so that you don't kill the database.</a:t>
+            </a:r>
+          </a:p>
+          <a:p>
+            <a:pPr algn="ctr"/>
+            <a:endParaRPr lang="en-US" dirty="0" smtClean="0"/>
+          </a:p>
+          <a:p>
+            <a:pPr algn="ctr"/>
+            <a:r>
+              <a:rPr lang="en-US" dirty="0" smtClean="0"/>
+              <a:t>No administrative stuff like user management or database creation</a:t>
+            </a:r>
+          </a:p>
+          <a:p>
+            <a:endParaRPr lang="en-US" dirty="0"/>
+          </a:p>
+        </p:txBody>
+      </p:sp>
+      <p:sp>
+        <p:nvSpPr>
+          <p:cNvPr id="4" name="Slide Number Placeholder 3"/>
+          <p:cNvSpPr>
+            <a:spLocks noGrp="1"/>
+          </p:cNvSpPr>
+          <p:nvPr>
+            <p:ph type="sldNum" sz="quarter" idx="10"/>
+          </p:nvPr>
+        </p:nvSpPr>
+        <p:spPr/>
+        <p:txBody>
+          <a:bodyPr/>
+          <a:lstStyle/>
+          <a:p>
+            <a:fld id="{8F02F506-0DE5-BF4F-9118-E0A27549203C}" type="slidenum">
+              <a:rPr lang="en-US" smtClean="0"/>
+              <a:t>6</a:t>
+            </a:fld>
+            <a:endParaRPr lang="en-US"/>
+          </a:p>
+        </p:txBody>
+      </p:sp>
+    </p:spTree>
+    <p:extLst>
+      <p:ext uri="{BB962C8B-B14F-4D97-AF65-F5344CB8AC3E}">
+        <p14:creationId xmlns:p14="http://schemas.microsoft.com/office/powerpoint/2010/main" val="2719542430"/>
+      </p:ext>
+    </p:extLst>
+  </p:cSld>
+  <p:clrMapOvr>
+    <a:masterClrMapping/>
+  </p:clrMapOvr>
+</p:notes>
+</file>
+
+<file path=ppt/notesSlides/notesSlide5.xml><?xml version="1.0" encoding="utf-8"?>
+<p:notes xmlns:a="http://schemas.openxmlformats.org/drawingml/2006/main" xmlns:r="http://schemas.openxmlformats.org/officeDocument/2006/relationships" xmlns:p="http://schemas.openxmlformats.org/presentationml/2006/main">
+  <p:cSld>
+    <p:spTree>
+      <p:nvGrpSpPr>
+        <p:cNvPr id="1" name=""/>
+        <p:cNvGrpSpPr/>
+        <p:nvPr/>
+      </p:nvGrpSpPr>
+      <p:grpSpPr>
+        <a:xfrm>
+          <a:off x="0" y="0"/>
+          <a:ext cx="0" cy="0"/>
+          <a:chOff x="0" y="0"/>
+          <a:chExt cx="0" cy="0"/>
+        </a:xfrm>
+      </p:grpSpPr>
+      <p:sp>
+        <p:nvSpPr>
+          <p:cNvPr id="2" name="Slide Image Placeholder 1"/>
+          <p:cNvSpPr>
+            <a:spLocks noGrp="1" noRot="1" noChangeAspect="1"/>
+          </p:cNvSpPr>
+          <p:nvPr>
+            <p:ph type="sldImg"/>
+          </p:nvPr>
+        </p:nvSpPr>
+        <p:spPr/>
+      </p:sp>
+      <p:sp>
+        <p:nvSpPr>
+          <p:cNvPr id="3" name="Notes Placeholder 2"/>
+          <p:cNvSpPr>
+            <a:spLocks noGrp="1"/>
+          </p:cNvSpPr>
+          <p:nvPr>
+            <p:ph type="body" idx="1"/>
+          </p:nvPr>
+        </p:nvSpPr>
+        <p:spPr/>
+        <p:txBody>
+          <a:bodyPr/>
+          <a:lstStyle/>
+          <a:p>
+            <a:r>
+              <a:rPr lang="en-US" dirty="0" smtClean="0"/>
+              <a:t>Pagination! You can now pull 2 million data points in one query and browse them page for page, because the tool stores the full result in the webserver, not in the client</a:t>
+            </a:r>
+          </a:p>
+          <a:p>
+            <a:endParaRPr lang="en-US" dirty="0" smtClean="0"/>
+          </a:p>
+          <a:p>
+            <a:r>
+              <a:rPr lang="en-US" dirty="0" smtClean="0"/>
+              <a:t>Caching. The tool caches the results for a couple of minutes so that you can re-use them without having to wait for the database. You can of course also tell it to get fresh data instead.</a:t>
+            </a:r>
+          </a:p>
+          <a:p>
+            <a:endParaRPr lang="en-US" dirty="0" smtClean="0"/>
+          </a:p>
+          <a:p>
+            <a:r>
+              <a:rPr lang="en-US" dirty="0" smtClean="0"/>
+              <a:t>Better handling of timestamps: they are displayed in both the internal and a human readable format</a:t>
+            </a:r>
+          </a:p>
+          <a:p>
+            <a:endParaRPr lang="en-US" dirty="0" smtClean="0"/>
+          </a:p>
+          <a:p>
+            <a:r>
+              <a:rPr lang="en-US" dirty="0" smtClean="0"/>
+              <a:t>Auto limit. If you run a select query against the database and forget to add a limit clause, the tool will add it for you, so that you don't kill the database.</a:t>
+            </a:r>
+          </a:p>
+          <a:p>
+            <a:pPr algn="ctr"/>
+            <a:endParaRPr lang="en-US" dirty="0" smtClean="0"/>
+          </a:p>
+          <a:p>
+            <a:pPr algn="ctr"/>
+            <a:r>
+              <a:rPr lang="en-US" dirty="0" smtClean="0"/>
+              <a:t>No administrative stuff like user management or database creation</a:t>
+            </a:r>
+          </a:p>
+          <a:p>
+            <a:endParaRPr lang="en-US" dirty="0"/>
+          </a:p>
+        </p:txBody>
+      </p:sp>
+      <p:sp>
+        <p:nvSpPr>
+          <p:cNvPr id="4" name="Slide Number Placeholder 3"/>
+          <p:cNvSpPr>
+            <a:spLocks noGrp="1"/>
+          </p:cNvSpPr>
+          <p:nvPr>
+            <p:ph type="sldNum" sz="quarter" idx="10"/>
+          </p:nvPr>
+        </p:nvSpPr>
+        <p:spPr/>
+        <p:txBody>
+          <a:bodyPr/>
+          <a:lstStyle/>
+          <a:p>
+            <a:fld id="{8F02F506-0DE5-BF4F-9118-E0A27549203C}" type="slidenum">
+              <a:rPr lang="en-US" smtClean="0"/>
+              <a:t>7</a:t>
+            </a:fld>
+            <a:endParaRPr lang="en-US"/>
+          </a:p>
+        </p:txBody>
+      </p:sp>
+    </p:spTree>
+    <p:extLst>
+      <p:ext uri="{BB962C8B-B14F-4D97-AF65-F5344CB8AC3E}">
+        <p14:creationId xmlns:p14="http://schemas.microsoft.com/office/powerpoint/2010/main" val="2719542430"/>
+      </p:ext>
+    </p:extLst>
+  </p:cSld>
+  <p:clrMapOvr>
+    <a:masterClrMapping/>
+  </p:clrMapOvr>
+</p:notes>
+</file>
+
+<file path=ppt/notesSlides/notesSlide6.xml><?xml version="1.0" encoding="utf-8"?>
+<p:notes xmlns:a="http://schemas.openxmlformats.org/drawingml/2006/main" xmlns:r="http://schemas.openxmlformats.org/officeDocument/2006/relationships" xmlns:p="http://schemas.openxmlformats.org/presentationml/2006/main">
+  <p:cSld>
+    <p:spTree>
+      <p:nvGrpSpPr>
+        <p:cNvPr id="1" name=""/>
+        <p:cNvGrpSpPr/>
+        <p:nvPr/>
+      </p:nvGrpSpPr>
+      <p:grpSpPr>
+        <a:xfrm>
+          <a:off x="0" y="0"/>
+          <a:ext cx="0" cy="0"/>
+          <a:chOff x="0" y="0"/>
+          <a:chExt cx="0" cy="0"/>
+        </a:xfrm>
+      </p:grpSpPr>
+      <p:sp>
+        <p:nvSpPr>
+          <p:cNvPr id="2" name="Slide Image Placeholder 1"/>
+          <p:cNvSpPr>
+            <a:spLocks noGrp="1" noRot="1" noChangeAspect="1"/>
+          </p:cNvSpPr>
+          <p:nvPr>
+            <p:ph type="sldImg"/>
+          </p:nvPr>
+        </p:nvSpPr>
+        <p:spPr/>
+      </p:sp>
+      <p:sp>
+        <p:nvSpPr>
+          <p:cNvPr id="3" name="Notes Placeholder 2"/>
+          <p:cNvSpPr>
+            <a:spLocks noGrp="1"/>
+          </p:cNvSpPr>
+          <p:nvPr>
+            <p:ph type="body" idx="1"/>
+          </p:nvPr>
+        </p:nvSpPr>
+        <p:spPr/>
+        <p:txBody>
+          <a:bodyPr/>
+          <a:lstStyle/>
+          <a:p>
+            <a:r>
+              <a:rPr lang="en-US" dirty="0" smtClean="0"/>
+              <a:t>Pagination! You can now pull 2 million data points in one query and browse them page for page, because the tool stores the full result in the webserver, not in the client</a:t>
+            </a:r>
+          </a:p>
+          <a:p>
+            <a:endParaRPr lang="en-US" dirty="0" smtClean="0"/>
+          </a:p>
+          <a:p>
+            <a:r>
+              <a:rPr lang="en-US" dirty="0" smtClean="0"/>
+              <a:t>Caching. The tool caches the results for a couple of minutes so that you can re-use them without having to wait for the database. You can of course also tell it to get fresh data instead.</a:t>
+            </a:r>
+          </a:p>
+          <a:p>
+            <a:endParaRPr lang="en-US" dirty="0" smtClean="0"/>
+          </a:p>
+          <a:p>
+            <a:r>
+              <a:rPr lang="en-US" dirty="0" smtClean="0"/>
+              <a:t>Better handling of timestamps: they are displayed in both the internal and a human readable format</a:t>
+            </a:r>
+          </a:p>
+          <a:p>
+            <a:endParaRPr lang="en-US" dirty="0" smtClean="0"/>
+          </a:p>
+          <a:p>
+            <a:r>
+              <a:rPr lang="en-US" dirty="0" smtClean="0"/>
+              <a:t>Auto limit. If you run a select query against the database and forget to add a limit clause, the tool will add it for you, so that you don't kill the database.</a:t>
+            </a:r>
+          </a:p>
+          <a:p>
+            <a:pPr algn="ctr"/>
+            <a:endParaRPr lang="en-US" dirty="0" smtClean="0"/>
+          </a:p>
+          <a:p>
+            <a:pPr algn="ctr"/>
+            <a:r>
+              <a:rPr lang="en-US" dirty="0" smtClean="0"/>
+              <a:t>No administrative stuff like user management or database creation</a:t>
+            </a:r>
+          </a:p>
+          <a:p>
+            <a:endParaRPr lang="en-US" dirty="0"/>
+          </a:p>
+        </p:txBody>
+      </p:sp>
+      <p:sp>
+        <p:nvSpPr>
+          <p:cNvPr id="4" name="Slide Number Placeholder 3"/>
+          <p:cNvSpPr>
+            <a:spLocks noGrp="1"/>
+          </p:cNvSpPr>
+          <p:nvPr>
+            <p:ph type="sldNum" sz="quarter" idx="10"/>
+          </p:nvPr>
+        </p:nvSpPr>
+        <p:spPr/>
+        <p:txBody>
+          <a:bodyPr/>
+          <a:lstStyle/>
+          <a:p>
+            <a:fld id="{8F02F506-0DE5-BF4F-9118-E0A27549203C}" type="slidenum">
+              <a:rPr lang="en-US" smtClean="0"/>
+              <a:t>8</a:t>
+            </a:fld>
+            <a:endParaRPr lang="en-US"/>
+          </a:p>
+        </p:txBody>
+      </p:sp>
+    </p:spTree>
+    <p:extLst>
+      <p:ext uri="{BB962C8B-B14F-4D97-AF65-F5344CB8AC3E}">
+        <p14:creationId xmlns:p14="http://schemas.microsoft.com/office/powerpoint/2010/main" val="2719542430"/>
+      </p:ext>
+    </p:extLst>
+  </p:cSld>
+  <p:clrMapOvr>
+    <a:masterClrMapping/>
+  </p:clrMapOvr>
+</p:notes>
+</file>
+
+<file path=ppt/notesSlides/notesSlide7.xml><?xml version="1.0" encoding="utf-8"?>
+<p:notes xmlns:a="http://schemas.openxmlformats.org/drawingml/2006/main" xmlns:r="http://schemas.openxmlformats.org/officeDocument/2006/relationships" xmlns:p="http://schemas.openxmlformats.org/presentationml/2006/main">
+  <p:cSld>
+    <p:spTree>
+      <p:nvGrpSpPr>
+        <p:cNvPr id="1" name=""/>
+        <p:cNvGrpSpPr/>
+        <p:nvPr/>
+      </p:nvGrpSpPr>
+      <p:grpSpPr>
+        <a:xfrm>
+          <a:off x="0" y="0"/>
+          <a:ext cx="0" cy="0"/>
+          <a:chOff x="0" y="0"/>
+          <a:chExt cx="0" cy="0"/>
+        </a:xfrm>
+      </p:grpSpPr>
+      <p:sp>
+        <p:nvSpPr>
+          <p:cNvPr id="2" name="Slide Image Placeholder 1"/>
+          <p:cNvSpPr>
+            <a:spLocks noGrp="1" noRot="1" noChangeAspect="1"/>
+          </p:cNvSpPr>
+          <p:nvPr>
+            <p:ph type="sldImg"/>
+          </p:nvPr>
+        </p:nvSpPr>
+        <p:spPr/>
+      </p:sp>
+      <p:sp>
+        <p:nvSpPr>
+          <p:cNvPr id="3" name="Notes Placeholder 2"/>
+          <p:cNvSpPr>
+            <a:spLocks noGrp="1"/>
+          </p:cNvSpPr>
+          <p:nvPr>
+            <p:ph type="body" idx="1"/>
+          </p:nvPr>
+        </p:nvSpPr>
+        <p:spPr/>
+        <p:txBody>
+          <a:bodyPr/>
+          <a:lstStyle/>
+          <a:p>
+            <a:r>
+              <a:rPr lang="en-US" dirty="0" smtClean="0"/>
+              <a:t>Pagination! You can now pull 2 million data points in one query and browse them page for page, because the tool stores the full result in the webserver, not in the client</a:t>
+            </a:r>
+          </a:p>
+          <a:p>
+            <a:endParaRPr lang="en-US" dirty="0" smtClean="0"/>
+          </a:p>
+          <a:p>
+            <a:r>
+              <a:rPr lang="en-US" dirty="0" smtClean="0"/>
+              <a:t>Caching. The tool caches the results for a couple of minutes so that you can re-use them without having to wait for the database. You can of course also tell it to get fresh data instead.</a:t>
+            </a:r>
+          </a:p>
+          <a:p>
+            <a:endParaRPr lang="en-US" dirty="0" smtClean="0"/>
+          </a:p>
+          <a:p>
+            <a:r>
+              <a:rPr lang="en-US" dirty="0" smtClean="0"/>
+              <a:t>Better handling of timestamps: they are displayed in both the internal and a human readable format</a:t>
+            </a:r>
+          </a:p>
+          <a:p>
+            <a:endParaRPr lang="en-US" dirty="0" smtClean="0"/>
+          </a:p>
+          <a:p>
+            <a:r>
+              <a:rPr lang="en-US" dirty="0" smtClean="0"/>
+              <a:t>Auto limit. If you run a select query against the database and forget to add a limit clause, the tool will add it for you, so that you don't kill the database.</a:t>
+            </a:r>
+          </a:p>
+          <a:p>
+            <a:pPr algn="ctr"/>
+            <a:endParaRPr lang="en-US" dirty="0" smtClean="0"/>
+          </a:p>
+          <a:p>
+            <a:pPr algn="ctr"/>
+            <a:r>
+              <a:rPr lang="en-US" dirty="0" smtClean="0"/>
+              <a:t>No administrative stuff like user management or database creation</a:t>
+            </a:r>
+          </a:p>
+          <a:p>
+            <a:endParaRPr lang="en-US" dirty="0"/>
+          </a:p>
+        </p:txBody>
+      </p:sp>
+      <p:sp>
+        <p:nvSpPr>
+          <p:cNvPr id="4" name="Slide Number Placeholder 3"/>
+          <p:cNvSpPr>
+            <a:spLocks noGrp="1"/>
+          </p:cNvSpPr>
+          <p:nvPr>
+            <p:ph type="sldNum" sz="quarter" idx="10"/>
+          </p:nvPr>
+        </p:nvSpPr>
+        <p:spPr/>
+        <p:txBody>
+          <a:bodyPr/>
+          <a:lstStyle/>
+          <a:p>
+            <a:fld id="{8F02F506-0DE5-BF4F-9118-E0A27549203C}" type="slidenum">
+              <a:rPr lang="en-US" smtClean="0"/>
+              <a:t>9</a:t>
+            </a:fld>
+            <a:endParaRPr lang="en-US"/>
+          </a:p>
+        </p:txBody>
+      </p:sp>
+    </p:spTree>
+    <p:extLst>
+      <p:ext uri="{BB962C8B-B14F-4D97-AF65-F5344CB8AC3E}">
+        <p14:creationId xmlns:p14="http://schemas.microsoft.com/office/powerpoint/2010/main" val="2719542430"/>
+      </p:ext>
+    </p:extLst>
+  </p:cSld>
+  <p:clrMapOvr>
+    <a:masterClrMapping/>
+  </p:clrMapOvr>
+</p:notes>
+</file>
+
+<file path=ppt/notesSlides/notesSlide8.xml><?xml version="1.0" encoding="utf-8"?>
+<p:notes xmlns:a="http://schemas.openxmlformats.org/drawingml/2006/main" xmlns:r="http://schemas.openxmlformats.org/officeDocument/2006/relationships" xmlns:p="http://schemas.openxmlformats.org/presentationml/2006/main">
+  <p:cSld>
+    <p:spTree>
+      <p:nvGrpSpPr>
+        <p:cNvPr id="1" name=""/>
+        <p:cNvGrpSpPr/>
+        <p:nvPr/>
+      </p:nvGrpSpPr>
+      <p:grpSpPr>
+        <a:xfrm>
+          <a:off x="0" y="0"/>
+          <a:ext cx="0" cy="0"/>
+          <a:chOff x="0" y="0"/>
+          <a:chExt cx="0" cy="0"/>
+        </a:xfrm>
+      </p:grpSpPr>
+      <p:sp>
+        <p:nvSpPr>
+          <p:cNvPr id="2" name="Slide Image Placeholder 1"/>
+          <p:cNvSpPr>
+            <a:spLocks noGrp="1" noRot="1" noChangeAspect="1"/>
+          </p:cNvSpPr>
+          <p:nvPr>
+            <p:ph type="sldImg"/>
+          </p:nvPr>
+        </p:nvSpPr>
+        <p:spPr/>
+      </p:sp>
+      <p:sp>
+        <p:nvSpPr>
+          <p:cNvPr id="3" name="Notes Placeholder 2"/>
+          <p:cNvSpPr>
+            <a:spLocks noGrp="1"/>
+          </p:cNvSpPr>
+          <p:nvPr>
+            <p:ph type="body" idx="1"/>
+          </p:nvPr>
+        </p:nvSpPr>
+        <p:spPr/>
+        <p:txBody>
+          <a:bodyPr/>
+          <a:lstStyle/>
+          <a:p>
+            <a:r>
+              <a:rPr lang="en-US" dirty="0" smtClean="0"/>
+              <a:t>Pagination! You can now pull 2 million data points in one query and browse them page for page, because the tool stores the full result in the webserver, not in the client</a:t>
+            </a:r>
+          </a:p>
+          <a:p>
+            <a:endParaRPr lang="en-US" dirty="0" smtClean="0"/>
+          </a:p>
+          <a:p>
+            <a:r>
+              <a:rPr lang="en-US" dirty="0" smtClean="0"/>
+              <a:t>Caching. The tool caches the results for a couple of minutes so that you can re-use them without having to wait for the database. You can of course also tell it to get fresh data instead.</a:t>
+            </a:r>
+          </a:p>
+          <a:p>
+            <a:endParaRPr lang="en-US" dirty="0" smtClean="0"/>
+          </a:p>
+          <a:p>
+            <a:r>
+              <a:rPr lang="en-US" dirty="0" smtClean="0"/>
+              <a:t>Better handling of timestamps: they are displayed in both the internal and a human readable format</a:t>
+            </a:r>
+          </a:p>
+          <a:p>
+            <a:endParaRPr lang="en-US" dirty="0" smtClean="0"/>
+          </a:p>
+          <a:p>
+            <a:r>
+              <a:rPr lang="en-US" dirty="0" smtClean="0"/>
+              <a:t>Auto limit. If you run a select query against the database and forget to add a limit clause, the tool will add it for you, so that you don't kill the database.</a:t>
+            </a:r>
+          </a:p>
+          <a:p>
+            <a:pPr algn="ctr"/>
+            <a:endParaRPr lang="en-US" dirty="0" smtClean="0"/>
+          </a:p>
+          <a:p>
+            <a:pPr algn="ctr"/>
+            <a:r>
+              <a:rPr lang="en-US" dirty="0" smtClean="0"/>
+              <a:t>No administrative stuff like user management or database creation</a:t>
+            </a:r>
+          </a:p>
+          <a:p>
+            <a:endParaRPr lang="en-US" dirty="0"/>
+          </a:p>
+        </p:txBody>
+      </p:sp>
+      <p:sp>
+        <p:nvSpPr>
+          <p:cNvPr id="4" name="Slide Number Placeholder 3"/>
+          <p:cNvSpPr>
+            <a:spLocks noGrp="1"/>
+          </p:cNvSpPr>
+          <p:nvPr>
+            <p:ph type="sldNum" sz="quarter" idx="10"/>
+          </p:nvPr>
+        </p:nvSpPr>
+        <p:spPr/>
+        <p:txBody>
+          <a:bodyPr/>
+          <a:lstStyle/>
+          <a:p>
+            <a:fld id="{8F02F506-0DE5-BF4F-9118-E0A27549203C}" type="slidenum">
+              <a:rPr lang="en-US" smtClean="0"/>
+              <a:t>10</a:t>
+            </a:fld>
+            <a:endParaRPr lang="en-US"/>
+          </a:p>
+        </p:txBody>
+      </p:sp>
+    </p:spTree>
+    <p:extLst>
+      <p:ext uri="{BB962C8B-B14F-4D97-AF65-F5344CB8AC3E}">
+        <p14:creationId xmlns:p14="http://schemas.microsoft.com/office/powerpoint/2010/main" val="2719542430"/>
+      </p:ext>
+    </p:extLst>
+  </p:cSld>
+  <p:clrMapOvr>
+    <a:masterClrMapping/>
+  </p:clrMapOvr>
+</p:notes>
+</file>
+
+<file path=ppt/notesSlides/notesSlide9.xml><?xml version="1.0" encoding="utf-8"?>
+<p:notes xmlns:a="http://schemas.openxmlformats.org/drawingml/2006/main" xmlns:r="http://schemas.openxmlformats.org/officeDocument/2006/relationships" xmlns:p="http://schemas.openxmlformats.org/presentationml/2006/main">
+  <p:cSld>
+    <p:spTree>
+      <p:nvGrpSpPr>
+        <p:cNvPr id="1" name=""/>
+        <p:cNvGrpSpPr/>
+        <p:nvPr/>
+      </p:nvGrpSpPr>
+      <p:grpSpPr>
+        <a:xfrm>
+          <a:off x="0" y="0"/>
+          <a:ext cx="0" cy="0"/>
+          <a:chOff x="0" y="0"/>
+          <a:chExt cx="0" cy="0"/>
+        </a:xfrm>
+      </p:grpSpPr>
+      <p:sp>
+        <p:nvSpPr>
+          <p:cNvPr id="2" name="Slide Image Placeholder 1"/>
+          <p:cNvSpPr>
+            <a:spLocks noGrp="1" noRot="1" noChangeAspect="1"/>
+          </p:cNvSpPr>
+          <p:nvPr>
+            <p:ph type="sldImg"/>
+          </p:nvPr>
+        </p:nvSpPr>
+        <p:spPr/>
+      </p:sp>
+      <p:sp>
+        <p:nvSpPr>
+          <p:cNvPr id="3" name="Notes Placeholder 2"/>
+          <p:cNvSpPr>
+            <a:spLocks noGrp="1"/>
+          </p:cNvSpPr>
+          <p:nvPr>
+            <p:ph type="body" idx="1"/>
+          </p:nvPr>
+        </p:nvSpPr>
+        <p:spPr/>
+        <p:txBody>
+          <a:bodyPr/>
+          <a:lstStyle/>
+          <a:p>
+            <a:r>
+              <a:rPr lang="en-US" dirty="0" smtClean="0"/>
+              <a:t>Pagination! You can now pull 2 million data points in one query and browse them page for page, because the tool stores the full result in the webserver, not in the client</a:t>
+            </a:r>
+          </a:p>
+          <a:p>
+            <a:endParaRPr lang="en-US" dirty="0" smtClean="0"/>
+          </a:p>
+          <a:p>
+            <a:r>
+              <a:rPr lang="en-US" dirty="0" smtClean="0"/>
+              <a:t>Caching. The tool caches the results for a couple of minutes so that you can re-use them without having to wait for the database. You can of course also tell it to get fresh data instead.</a:t>
+            </a:r>
+          </a:p>
+          <a:p>
+            <a:endParaRPr lang="en-US" dirty="0" smtClean="0"/>
+          </a:p>
+          <a:p>
+            <a:r>
+              <a:rPr lang="en-US" dirty="0" smtClean="0"/>
+              <a:t>Better handling of timestamps: they are displayed in both the internal and a human readable format</a:t>
+            </a:r>
+          </a:p>
+          <a:p>
+            <a:endParaRPr lang="en-US" dirty="0" smtClean="0"/>
+          </a:p>
+          <a:p>
+            <a:r>
+              <a:rPr lang="en-US" dirty="0" smtClean="0"/>
+              <a:t>Auto limit. If you run a select query against the database and forget to add a limit clause, the tool will add it for you, so that you don't kill the database.</a:t>
+            </a:r>
+          </a:p>
+          <a:p>
+            <a:pPr algn="ctr"/>
+            <a:endParaRPr lang="en-US" dirty="0" smtClean="0"/>
+          </a:p>
+          <a:p>
+            <a:pPr algn="ctr"/>
+            <a:r>
+              <a:rPr lang="en-US" dirty="0" smtClean="0"/>
+              <a:t>No administrative stuff like user management or database creation</a:t>
+            </a:r>
+          </a:p>
+          <a:p>
+            <a:endParaRPr lang="en-US" dirty="0"/>
+          </a:p>
+        </p:txBody>
+      </p:sp>
+      <p:sp>
+        <p:nvSpPr>
+          <p:cNvPr id="4" name="Slide Number Placeholder 3"/>
+          <p:cNvSpPr>
+            <a:spLocks noGrp="1"/>
+          </p:cNvSpPr>
+          <p:nvPr>
+            <p:ph type="sldNum" sz="quarter" idx="10"/>
+          </p:nvPr>
+        </p:nvSpPr>
+        <p:spPr/>
+        <p:txBody>
+          <a:bodyPr/>
+          <a:lstStyle/>
+          <a:p>
+            <a:fld id="{8F02F506-0DE5-BF4F-9118-E0A27549203C}" type="slidenum">
+              <a:rPr lang="en-US" smtClean="0"/>
+              <a:t>11</a:t>
             </a:fld>
             <a:endParaRPr lang="en-US"/>
           </a:p>
@@ -4450,6 +5443,370 @@
 </p:sld>
 </file>
 
+<file path=ppt/slides/slide10.xml><?xml version="1.0" encoding="utf-8"?>
+<p:sld xmlns:a="http://schemas.openxmlformats.org/drawingml/2006/main" xmlns:r="http://schemas.openxmlformats.org/officeDocument/2006/relationships" xmlns:p="http://schemas.openxmlformats.org/presentationml/2006/main">
+  <p:cSld>
+    <p:spTree>
+      <p:nvGrpSpPr>
+        <p:cNvPr id="1" name=""/>
+        <p:cNvGrpSpPr/>
+        <p:nvPr/>
+      </p:nvGrpSpPr>
+      <p:grpSpPr>
+        <a:xfrm>
+          <a:off x="0" y="0"/>
+          <a:ext cx="0" cy="0"/>
+          <a:chOff x="0" y="0"/>
+          <a:chExt cx="0" cy="0"/>
+        </a:xfrm>
+      </p:grpSpPr>
+      <p:sp>
+        <p:nvSpPr>
+          <p:cNvPr id="2" name="Title 1"/>
+          <p:cNvSpPr>
+            <a:spLocks noGrp="1"/>
+          </p:cNvSpPr>
+          <p:nvPr>
+            <p:ph type="title"/>
+          </p:nvPr>
+        </p:nvSpPr>
+        <p:spPr/>
+        <p:txBody>
+          <a:bodyPr/>
+          <a:lstStyle/>
+          <a:p>
+            <a:r>
+              <a:rPr lang="en-US" dirty="0"/>
+              <a:t>Login history</a:t>
+            </a:r>
+            <a:endParaRPr lang="en-US" dirty="0">
+              <a:solidFill>
+                <a:srgbClr val="A6A6A6"/>
+              </a:solidFill>
+            </a:endParaRPr>
+          </a:p>
+        </p:txBody>
+      </p:sp>
+      <p:sp>
+        <p:nvSpPr>
+          <p:cNvPr id="3" name="Content Placeholder 2"/>
+          <p:cNvSpPr>
+            <a:spLocks noGrp="1"/>
+          </p:cNvSpPr>
+          <p:nvPr>
+            <p:ph idx="1"/>
+          </p:nvPr>
+        </p:nvSpPr>
+        <p:spPr>
+          <a:xfrm>
+            <a:off x="549275" y="1200152"/>
+            <a:ext cx="4019632" cy="2675320"/>
+          </a:xfrm>
+        </p:spPr>
+        <p:txBody>
+          <a:bodyPr>
+            <a:normAutofit/>
+          </a:bodyPr>
+          <a:lstStyle/>
+          <a:p>
+            <a:endParaRPr lang="en-US" dirty="0"/>
+          </a:p>
+        </p:txBody>
+      </p:sp>
+    </p:spTree>
+    <p:extLst>
+      <p:ext uri="{BB962C8B-B14F-4D97-AF65-F5344CB8AC3E}">
+        <p14:creationId xmlns:p14="http://schemas.microsoft.com/office/powerpoint/2010/main" val="3166457393"/>
+      </p:ext>
+    </p:extLst>
+  </p:cSld>
+  <p:clrMapOvr>
+    <a:masterClrMapping/>
+  </p:clrMapOvr>
+  <p:timing>
+    <p:tnLst>
+      <p:par>
+        <p:cTn xmlns:p14="http://schemas.microsoft.com/office/powerpoint/2010/main" id="1" dur="indefinite" restart="never" nodeType="tmRoot"/>
+      </p:par>
+    </p:tnLst>
+  </p:timing>
+</p:sld>
+</file>
+
+<file path=ppt/slides/slide11.xml><?xml version="1.0" encoding="utf-8"?>
+<p:sld xmlns:a="http://schemas.openxmlformats.org/drawingml/2006/main" xmlns:r="http://schemas.openxmlformats.org/officeDocument/2006/relationships" xmlns:p="http://schemas.openxmlformats.org/presentationml/2006/main">
+  <p:cSld>
+    <p:spTree>
+      <p:nvGrpSpPr>
+        <p:cNvPr id="1" name=""/>
+        <p:cNvGrpSpPr/>
+        <p:nvPr/>
+      </p:nvGrpSpPr>
+      <p:grpSpPr>
+        <a:xfrm>
+          <a:off x="0" y="0"/>
+          <a:ext cx="0" cy="0"/>
+          <a:chOff x="0" y="0"/>
+          <a:chExt cx="0" cy="0"/>
+        </a:xfrm>
+      </p:grpSpPr>
+      <p:sp>
+        <p:nvSpPr>
+          <p:cNvPr id="2" name="Title 1"/>
+          <p:cNvSpPr>
+            <a:spLocks noGrp="1"/>
+          </p:cNvSpPr>
+          <p:nvPr>
+            <p:ph type="title"/>
+          </p:nvPr>
+        </p:nvSpPr>
+        <p:spPr/>
+        <p:txBody>
+          <a:bodyPr/>
+          <a:lstStyle/>
+          <a:p>
+            <a:r>
+              <a:rPr lang="en-US" dirty="0"/>
+              <a:t>Caching</a:t>
+            </a:r>
+            <a:endParaRPr lang="en-US" dirty="0">
+              <a:solidFill>
+                <a:srgbClr val="A6A6A6"/>
+              </a:solidFill>
+            </a:endParaRPr>
+          </a:p>
+        </p:txBody>
+      </p:sp>
+      <p:sp>
+        <p:nvSpPr>
+          <p:cNvPr id="3" name="Content Placeholder 2"/>
+          <p:cNvSpPr>
+            <a:spLocks noGrp="1"/>
+          </p:cNvSpPr>
+          <p:nvPr>
+            <p:ph idx="1"/>
+          </p:nvPr>
+        </p:nvSpPr>
+        <p:spPr>
+          <a:xfrm>
+            <a:off x="549275" y="1200152"/>
+            <a:ext cx="4019632" cy="2675320"/>
+          </a:xfrm>
+        </p:spPr>
+        <p:txBody>
+          <a:bodyPr>
+            <a:normAutofit/>
+          </a:bodyPr>
+          <a:lstStyle/>
+          <a:p>
+            <a:endParaRPr lang="en-US" dirty="0"/>
+          </a:p>
+        </p:txBody>
+      </p:sp>
+    </p:spTree>
+    <p:extLst>
+      <p:ext uri="{BB962C8B-B14F-4D97-AF65-F5344CB8AC3E}">
+        <p14:creationId xmlns:p14="http://schemas.microsoft.com/office/powerpoint/2010/main" val="885997038"/>
+      </p:ext>
+    </p:extLst>
+  </p:cSld>
+  <p:clrMapOvr>
+    <a:masterClrMapping/>
+  </p:clrMapOvr>
+  <p:timing>
+    <p:tnLst>
+      <p:par>
+        <p:cTn xmlns:p14="http://schemas.microsoft.com/office/powerpoint/2010/main" id="1" dur="indefinite" restart="never" nodeType="tmRoot"/>
+      </p:par>
+    </p:tnLst>
+  </p:timing>
+</p:sld>
+</file>
+
+<file path=ppt/slides/slide12.xml><?xml version="1.0" encoding="utf-8"?>
+<p:sld xmlns:a="http://schemas.openxmlformats.org/drawingml/2006/main" xmlns:r="http://schemas.openxmlformats.org/officeDocument/2006/relationships" xmlns:p="http://schemas.openxmlformats.org/presentationml/2006/main">
+  <p:cSld>
+    <p:spTree>
+      <p:nvGrpSpPr>
+        <p:cNvPr id="1" name=""/>
+        <p:cNvGrpSpPr/>
+        <p:nvPr/>
+      </p:nvGrpSpPr>
+      <p:grpSpPr>
+        <a:xfrm>
+          <a:off x="0" y="0"/>
+          <a:ext cx="0" cy="0"/>
+          <a:chOff x="0" y="0"/>
+          <a:chExt cx="0" cy="0"/>
+        </a:xfrm>
+      </p:grpSpPr>
+      <p:sp>
+        <p:nvSpPr>
+          <p:cNvPr id="2" name="Title 1"/>
+          <p:cNvSpPr>
+            <a:spLocks noGrp="1"/>
+          </p:cNvSpPr>
+          <p:nvPr>
+            <p:ph type="title"/>
+          </p:nvPr>
+        </p:nvSpPr>
+        <p:spPr/>
+        <p:txBody>
+          <a:bodyPr/>
+          <a:lstStyle/>
+          <a:p>
+            <a:r>
+              <a:rPr lang="en-US" dirty="0" smtClean="0"/>
+              <a:t>Timestamps</a:t>
+            </a:r>
+            <a:endParaRPr lang="en-US" dirty="0">
+              <a:solidFill>
+                <a:srgbClr val="A6A6A6"/>
+              </a:solidFill>
+            </a:endParaRPr>
+          </a:p>
+        </p:txBody>
+      </p:sp>
+      <p:sp>
+        <p:nvSpPr>
+          <p:cNvPr id="3" name="Content Placeholder 2"/>
+          <p:cNvSpPr>
+            <a:spLocks noGrp="1"/>
+          </p:cNvSpPr>
+          <p:nvPr>
+            <p:ph idx="1"/>
+          </p:nvPr>
+        </p:nvSpPr>
+        <p:spPr>
+          <a:xfrm>
+            <a:off x="549275" y="1200152"/>
+            <a:ext cx="4019632" cy="2675320"/>
+          </a:xfrm>
+        </p:spPr>
+        <p:txBody>
+          <a:bodyPr>
+            <a:normAutofit/>
+          </a:bodyPr>
+          <a:lstStyle/>
+          <a:p>
+            <a:endParaRPr lang="en-US" dirty="0"/>
+          </a:p>
+        </p:txBody>
+      </p:sp>
+    </p:spTree>
+    <p:extLst>
+      <p:ext uri="{BB962C8B-B14F-4D97-AF65-F5344CB8AC3E}">
+        <p14:creationId xmlns:p14="http://schemas.microsoft.com/office/powerpoint/2010/main" val="2216473633"/>
+      </p:ext>
+    </p:extLst>
+  </p:cSld>
+  <p:clrMapOvr>
+    <a:masterClrMapping/>
+  </p:clrMapOvr>
+  <p:timing>
+    <p:tnLst>
+      <p:par>
+        <p:cTn xmlns:p14="http://schemas.microsoft.com/office/powerpoint/2010/main" id="1" dur="indefinite" restart="never" nodeType="tmRoot"/>
+      </p:par>
+    </p:tnLst>
+  </p:timing>
+</p:sld>
+</file>
+
+<file path=ppt/slides/slide13.xml><?xml version="1.0" encoding="utf-8"?>
+<p:sld xmlns:a="http://schemas.openxmlformats.org/drawingml/2006/main" xmlns:r="http://schemas.openxmlformats.org/officeDocument/2006/relationships" xmlns:p="http://schemas.openxmlformats.org/presentationml/2006/main">
+  <p:cSld>
+    <p:spTree>
+      <p:nvGrpSpPr>
+        <p:cNvPr id="1" name=""/>
+        <p:cNvGrpSpPr/>
+        <p:nvPr/>
+      </p:nvGrpSpPr>
+      <p:grpSpPr>
+        <a:xfrm>
+          <a:off x="0" y="0"/>
+          <a:ext cx="0" cy="0"/>
+          <a:chOff x="0" y="0"/>
+          <a:chExt cx="0" cy="0"/>
+        </a:xfrm>
+      </p:grpSpPr>
+      <p:sp>
+        <p:nvSpPr>
+          <p:cNvPr id="2" name="Title 1"/>
+          <p:cNvSpPr>
+            <a:spLocks noGrp="1"/>
+          </p:cNvSpPr>
+          <p:nvPr>
+            <p:ph type="title"/>
+          </p:nvPr>
+        </p:nvSpPr>
+        <p:spPr/>
+        <p:txBody>
+          <a:bodyPr/>
+          <a:lstStyle/>
+          <a:p>
+            <a:r>
+              <a:rPr lang="en-US" dirty="0"/>
+              <a:t>Auto </a:t>
+            </a:r>
+            <a:r>
+              <a:rPr lang="en-US" dirty="0" smtClean="0"/>
+              <a:t>LIMIT</a:t>
+            </a:r>
+            <a:endParaRPr lang="en-US" dirty="0">
+              <a:solidFill>
+                <a:srgbClr val="A6A6A6"/>
+              </a:solidFill>
+            </a:endParaRPr>
+          </a:p>
+        </p:txBody>
+      </p:sp>
+      <p:sp>
+        <p:nvSpPr>
+          <p:cNvPr id="3" name="Content Placeholder 2"/>
+          <p:cNvSpPr>
+            <a:spLocks noGrp="1"/>
+          </p:cNvSpPr>
+          <p:nvPr>
+            <p:ph idx="1"/>
+          </p:nvPr>
+        </p:nvSpPr>
+        <p:spPr>
+          <a:xfrm>
+            <a:off x="549275" y="1200152"/>
+            <a:ext cx="4019632" cy="2675320"/>
+          </a:xfrm>
+        </p:spPr>
+        <p:txBody>
+          <a:bodyPr>
+            <a:normAutofit/>
+          </a:bodyPr>
+          <a:lstStyle/>
+          <a:p>
+            <a:endParaRPr lang="en-US" dirty="0"/>
+          </a:p>
+        </p:txBody>
+      </p:sp>
+    </p:spTree>
+    <p:extLst>
+      <p:ext uri="{BB962C8B-B14F-4D97-AF65-F5344CB8AC3E}">
+        <p14:creationId xmlns:p14="http://schemas.microsoft.com/office/powerpoint/2010/main" val="4234035729"/>
+      </p:ext>
+    </p:extLst>
+  </p:cSld>
+  <p:clrMapOvr>
+    <a:masterClrMapping/>
+  </p:clrMapOvr>
+  <p:timing>
+    <p:tnLst>
+      <p:par>
+        <p:cTn xmlns:p14="http://schemas.microsoft.com/office/powerpoint/2010/main" id="1" dur="indefinite" restart="never" nodeType="tmRoot"/>
+      </p:par>
+    </p:tnLst>
+  </p:timing>
+</p:sld>
+</file>
+
 <file path=ppt/slides/slide2.xml><?xml version="1.0" encoding="utf-8"?>
 <p:sld xmlns:a="http://schemas.openxmlformats.org/drawingml/2006/main" xmlns:r="http://schemas.openxmlformats.org/officeDocument/2006/relationships" xmlns:p="http://schemas.openxmlformats.org/presentationml/2006/main">
   <p:cSld>
@@ -4900,88 +6257,13 @@
       </p:sp>
       <p:sp>
         <p:nvSpPr>
-          <p:cNvPr id="3" name="Content Placeholder 2"/>
-          <p:cNvSpPr>
-            <a:spLocks noGrp="1"/>
-          </p:cNvSpPr>
-          <p:nvPr>
-            <p:ph idx="1"/>
-          </p:nvPr>
-        </p:nvSpPr>
-        <p:spPr>
-          <a:xfrm>
-            <a:off x="549275" y="1200152"/>
-            <a:ext cx="4019632" cy="2675320"/>
-          </a:xfrm>
-        </p:spPr>
-        <p:txBody>
-          <a:bodyPr>
-            <a:normAutofit fontScale="92500" lnSpcReduction="10000"/>
-          </a:bodyPr>
-          <a:lstStyle/>
-          <a:p>
-            <a:r>
-              <a:rPr lang="en-US" dirty="0" smtClean="0"/>
-              <a:t>Proper UI </a:t>
-            </a:r>
-            <a:r>
-              <a:rPr lang="en-US" dirty="0"/>
-              <a:t>/ </a:t>
-            </a:r>
-            <a:r>
-              <a:rPr lang="en-US" dirty="0"/>
-              <a:t/>
-            </a:r>
-            <a:br>
-              <a:rPr lang="en-US" dirty="0"/>
-            </a:br>
-            <a:r>
-              <a:rPr lang="en-US" dirty="0" smtClean="0"/>
-              <a:t>button </a:t>
-            </a:r>
-            <a:r>
-              <a:rPr lang="en-US" dirty="0"/>
-              <a:t>feedback</a:t>
-            </a:r>
-          </a:p>
-          <a:p>
-            <a:r>
-              <a:rPr lang="en-US" dirty="0"/>
-              <a:t>F</a:t>
-            </a:r>
-            <a:r>
-              <a:rPr lang="en-US" dirty="0" smtClean="0"/>
-              <a:t>ull back-button </a:t>
-            </a:r>
-            <a:r>
-              <a:rPr lang="en-US" dirty="0"/>
-              <a:t>functionality</a:t>
-            </a:r>
-          </a:p>
-          <a:p>
-            <a:r>
-              <a:rPr lang="en-US" dirty="0" smtClean="0"/>
-              <a:t>Pagination</a:t>
-            </a:r>
-          </a:p>
-          <a:p>
-            <a:r>
-              <a:rPr lang="en-US" dirty="0" smtClean="0"/>
-              <a:t>Command history</a:t>
-            </a:r>
-            <a:endParaRPr lang="en-US" dirty="0"/>
-          </a:p>
-        </p:txBody>
-      </p:sp>
-      <p:sp>
-        <p:nvSpPr>
           <p:cNvPr id="4" name="Rectangle 3"/>
           <p:cNvSpPr/>
           <p:nvPr/>
         </p:nvSpPr>
         <p:spPr>
           <a:xfrm>
-            <a:off x="549275" y="4024093"/>
+            <a:off x="549275" y="2500091"/>
             <a:ext cx="8042276" cy="874086"/>
           </a:xfrm>
           <a:prstGeom prst="rect">
@@ -5020,280 +6302,6 @@
               <a:t>data retrieval</a:t>
             </a:r>
             <a:endParaRPr lang="en-US" sz="3200" dirty="0"/>
-          </a:p>
-        </p:txBody>
-      </p:sp>
-      <p:sp>
-        <p:nvSpPr>
-          <p:cNvPr id="5" name="Content Placeholder 2"/>
-          <p:cNvSpPr txBox="1">
-            <a:spLocks/>
-          </p:cNvSpPr>
-          <p:nvPr/>
-        </p:nvSpPr>
-        <p:spPr>
-          <a:xfrm>
-            <a:off x="4721307" y="1200344"/>
-            <a:ext cx="4019632" cy="2675320"/>
-          </a:xfrm>
-          <a:prstGeom prst="rect">
-            <a:avLst/>
-          </a:prstGeom>
-        </p:spPr>
-        <p:txBody>
-          <a:bodyPr vert="horz" lIns="91440" tIns="45720" rIns="91440" bIns="45720" rtlCol="0">
-            <a:normAutofit lnSpcReduction="10000"/>
-          </a:bodyPr>
-          <a:lstStyle>
-            <a:lvl1pPr marL="349250" indent="-349250" algn="l" defTabSz="914400" rtl="0" eaLnBrk="1" latinLnBrk="0" hangingPunct="1">
-              <a:spcBef>
-                <a:spcPts val="2000"/>
-              </a:spcBef>
-              <a:buClr>
-                <a:schemeClr val="accent1">
-                  <a:lumMod val="60000"/>
-                  <a:lumOff val="40000"/>
-                </a:schemeClr>
-              </a:buClr>
-              <a:buSzPct val="110000"/>
-              <a:buFont typeface="Wingdings 2" pitchFamily="18" charset="2"/>
-              <a:buChar char=""/>
-              <a:defRPr sz="2400" kern="1200">
-                <a:solidFill>
-                  <a:schemeClr val="tx1">
-                    <a:lumMod val="65000"/>
-                    <a:lumOff val="35000"/>
-                  </a:schemeClr>
-                </a:solidFill>
-                <a:latin typeface="+mn-lt"/>
-                <a:ea typeface="+mn-ea"/>
-                <a:cs typeface="+mn-cs"/>
-              </a:defRPr>
-            </a:lvl1pPr>
-            <a:lvl2pPr marL="685800" indent="-336550" algn="l" defTabSz="914400" rtl="0" eaLnBrk="1" latinLnBrk="0" hangingPunct="1">
-              <a:spcBef>
-                <a:spcPts val="600"/>
-              </a:spcBef>
-              <a:buClr>
-                <a:schemeClr val="accent1">
-                  <a:lumMod val="75000"/>
-                </a:schemeClr>
-              </a:buClr>
-              <a:buSzPct val="110000"/>
-              <a:buFont typeface="Wingdings 2" pitchFamily="18" charset="2"/>
-              <a:buChar char=""/>
-              <a:defRPr sz="2200" kern="1200">
-                <a:solidFill>
-                  <a:schemeClr val="tx1">
-                    <a:lumMod val="65000"/>
-                    <a:lumOff val="35000"/>
-                  </a:schemeClr>
-                </a:solidFill>
-                <a:latin typeface="+mn-lt"/>
-                <a:ea typeface="+mn-ea"/>
-                <a:cs typeface="+mn-cs"/>
-              </a:defRPr>
-            </a:lvl2pPr>
-            <a:lvl3pPr marL="968375" indent="-282575" algn="l" defTabSz="914400" rtl="0" eaLnBrk="1" latinLnBrk="0" hangingPunct="1">
-              <a:spcBef>
-                <a:spcPts val="600"/>
-              </a:spcBef>
-              <a:buClr>
-                <a:schemeClr val="accent1">
-                  <a:lumMod val="60000"/>
-                  <a:lumOff val="40000"/>
-                </a:schemeClr>
-              </a:buClr>
-              <a:buSzPct val="110000"/>
-              <a:buFont typeface="Wingdings 2" pitchFamily="18" charset="2"/>
-              <a:buChar char=""/>
-              <a:defRPr sz="2000" kern="1200">
-                <a:solidFill>
-                  <a:schemeClr val="tx1">
-                    <a:lumMod val="65000"/>
-                    <a:lumOff val="35000"/>
-                  </a:schemeClr>
-                </a:solidFill>
-                <a:latin typeface="+mn-lt"/>
-                <a:ea typeface="+mn-ea"/>
-                <a:cs typeface="+mn-cs"/>
-              </a:defRPr>
-            </a:lvl3pPr>
-            <a:lvl4pPr marL="1263650" indent="-295275" algn="l" defTabSz="914400" rtl="0" eaLnBrk="1" latinLnBrk="0" hangingPunct="1">
-              <a:spcBef>
-                <a:spcPts val="600"/>
-              </a:spcBef>
-              <a:buClr>
-                <a:schemeClr val="accent1">
-                  <a:lumMod val="75000"/>
-                </a:schemeClr>
-              </a:buClr>
-              <a:buSzPct val="110000"/>
-              <a:buFont typeface="Wingdings 2" pitchFamily="18" charset="2"/>
-              <a:buChar char=""/>
-              <a:defRPr sz="1800" kern="1200">
-                <a:solidFill>
-                  <a:schemeClr val="tx1">
-                    <a:lumMod val="65000"/>
-                    <a:lumOff val="35000"/>
-                  </a:schemeClr>
-                </a:solidFill>
-                <a:latin typeface="+mn-lt"/>
-                <a:ea typeface="+mn-ea"/>
-                <a:cs typeface="+mn-cs"/>
-              </a:defRPr>
-            </a:lvl4pPr>
-            <a:lvl5pPr marL="1546225" indent="-282575" algn="l" defTabSz="914400" rtl="0" eaLnBrk="1" latinLnBrk="0" hangingPunct="1">
-              <a:spcBef>
-                <a:spcPts val="600"/>
-              </a:spcBef>
-              <a:buClr>
-                <a:schemeClr val="accent1">
-                  <a:lumMod val="60000"/>
-                  <a:lumOff val="40000"/>
-                </a:schemeClr>
-              </a:buClr>
-              <a:buSzPct val="110000"/>
-              <a:buFont typeface="Wingdings 2" pitchFamily="18" charset="2"/>
-              <a:buChar char=""/>
-              <a:defRPr sz="1800" kern="1200">
-                <a:solidFill>
-                  <a:schemeClr val="tx1">
-                    <a:lumMod val="65000"/>
-                    <a:lumOff val="35000"/>
-                  </a:schemeClr>
-                </a:solidFill>
-                <a:latin typeface="+mn-lt"/>
-                <a:ea typeface="+mn-ea"/>
-                <a:cs typeface="+mn-cs"/>
-              </a:defRPr>
-            </a:lvl5pPr>
-            <a:lvl6pPr marL="1828800" indent="-282575" algn="l" defTabSz="914400" rtl="0" eaLnBrk="1" latinLnBrk="0" hangingPunct="1">
-              <a:spcBef>
-                <a:spcPct val="20000"/>
-              </a:spcBef>
-              <a:buClr>
-                <a:schemeClr val="accent2"/>
-              </a:buClr>
-              <a:buSzPct val="110000"/>
-              <a:buFont typeface="Wingdings 2" pitchFamily="18" charset="2"/>
-              <a:buChar char=""/>
-              <a:defRPr lang="en-US" sz="1800" kern="1200" dirty="0" smtClean="0">
-                <a:solidFill>
-                  <a:schemeClr val="tx1">
-                    <a:lumMod val="65000"/>
-                    <a:lumOff val="35000"/>
-                  </a:schemeClr>
-                </a:solidFill>
-                <a:latin typeface="+mn-lt"/>
-                <a:ea typeface="+mn-ea"/>
-                <a:cs typeface="+mn-cs"/>
-              </a:defRPr>
-            </a:lvl6pPr>
-            <a:lvl7pPr marL="2117725" indent="-282575" algn="l" defTabSz="914400" rtl="0" eaLnBrk="1" latinLnBrk="0" hangingPunct="1">
-              <a:spcBef>
-                <a:spcPct val="20000"/>
-              </a:spcBef>
-              <a:buClr>
-                <a:schemeClr val="accent1">
-                  <a:lumMod val="60000"/>
-                  <a:lumOff val="40000"/>
-                </a:schemeClr>
-              </a:buClr>
-              <a:buSzPct val="110000"/>
-              <a:buFont typeface="Wingdings 2" pitchFamily="18" charset="2"/>
-              <a:buChar char=""/>
-              <a:defRPr lang="en-US" sz="1800" kern="1200" dirty="0" smtClean="0">
-                <a:solidFill>
-                  <a:schemeClr val="tx1">
-                    <a:lumMod val="65000"/>
-                    <a:lumOff val="35000"/>
-                  </a:schemeClr>
-                </a:solidFill>
-                <a:latin typeface="+mn-lt"/>
-                <a:ea typeface="+mn-ea"/>
-                <a:cs typeface="+mn-cs"/>
-              </a:defRPr>
-            </a:lvl7pPr>
-            <a:lvl8pPr marL="2398713" indent="-282575" algn="l" defTabSz="914400" rtl="0" eaLnBrk="1" latinLnBrk="0" hangingPunct="1">
-              <a:spcBef>
-                <a:spcPct val="20000"/>
-              </a:spcBef>
-              <a:buClr>
-                <a:schemeClr val="accent2"/>
-              </a:buClr>
-              <a:buSzPct val="110000"/>
-              <a:buFont typeface="Wingdings 2" pitchFamily="18" charset="2"/>
-              <a:buChar char=""/>
-              <a:defRPr lang="en-US" sz="1800" kern="1200" dirty="0" smtClean="0">
-                <a:solidFill>
-                  <a:schemeClr val="tx1">
-                    <a:lumMod val="65000"/>
-                    <a:lumOff val="35000"/>
-                  </a:schemeClr>
-                </a:solidFill>
-                <a:latin typeface="+mn-lt"/>
-                <a:ea typeface="+mn-ea"/>
-                <a:cs typeface="+mn-cs"/>
-              </a:defRPr>
-            </a:lvl8pPr>
-            <a:lvl9pPr marL="2689225" indent="-282575" algn="l" defTabSz="914400" rtl="0" eaLnBrk="1" latinLnBrk="0" hangingPunct="1">
-              <a:spcBef>
-                <a:spcPct val="20000"/>
-              </a:spcBef>
-              <a:buClr>
-                <a:schemeClr val="accent1">
-                  <a:lumMod val="60000"/>
-                  <a:lumOff val="40000"/>
-                </a:schemeClr>
-              </a:buClr>
-              <a:buSzPct val="110000"/>
-              <a:buFont typeface="Wingdings 2" pitchFamily="18" charset="2"/>
-              <a:buChar char=""/>
-              <a:defRPr lang="en-US" sz="1800" kern="1200" dirty="0">
-                <a:solidFill>
-                  <a:schemeClr val="tx1">
-                    <a:lumMod val="65000"/>
-                    <a:lumOff val="35000"/>
-                  </a:schemeClr>
-                </a:solidFill>
-                <a:latin typeface="+mn-lt"/>
-                <a:ea typeface="+mn-ea"/>
-                <a:cs typeface="+mn-cs"/>
-              </a:defRPr>
-            </a:lvl9pPr>
-          </a:lstStyle>
-          <a:p>
-            <a:r>
-              <a:rPr lang="en-US" dirty="0" smtClean="0"/>
-              <a:t>Login history</a:t>
-            </a:r>
-          </a:p>
-          <a:p>
-            <a:r>
-              <a:rPr lang="en-US" dirty="0" smtClean="0"/>
-              <a:t>Caching</a:t>
-            </a:r>
-          </a:p>
-          <a:p>
-            <a:r>
-              <a:rPr lang="en-US" dirty="0" smtClean="0"/>
-              <a:t>Better handling </a:t>
-            </a:r>
-            <a:br>
-              <a:rPr lang="en-US" dirty="0" smtClean="0"/>
-            </a:br>
-            <a:r>
-              <a:rPr lang="en-US" dirty="0" smtClean="0"/>
-              <a:t>of timestamps</a:t>
-            </a:r>
-          </a:p>
-          <a:p>
-            <a:r>
-              <a:rPr lang="en-US" dirty="0" smtClean="0"/>
-              <a:t>Auto LIMIT</a:t>
-            </a:r>
-            <a:endParaRPr lang="en-US" dirty="0"/>
           </a:p>
         </p:txBody>
       </p:sp>
@@ -5349,7 +6357,19 @@
           <a:bodyPr/>
           <a:lstStyle/>
           <a:p>
-            <a:endParaRPr lang="en-US"/>
+            <a:r>
+              <a:rPr lang="en-US" dirty="0"/>
+              <a:t>Proper UI / </a:t>
+            </a:r>
+            <a:r>
+              <a:rPr lang="en-US" dirty="0" smtClean="0"/>
+              <a:t>button </a:t>
+            </a:r>
+            <a:r>
+              <a:rPr lang="en-US" dirty="0"/>
+              <a:t>feedback</a:t>
+            </a:r>
+            <a:endParaRPr lang="en-US" dirty="0"/>
           </a:p>
         </p:txBody>
       </p:sp>
@@ -5363,19 +6383,26 @@
             <p:ph idx="1"/>
           </p:nvPr>
         </p:nvSpPr>
-        <p:spPr/>
-        <p:txBody>
-          <a:bodyPr/>
-          <a:lstStyle/>
-          <a:p>
-            <a:endParaRPr lang="en-US"/>
+        <p:spPr>
+          <a:xfrm>
+            <a:off x="549275" y="1200152"/>
+            <a:ext cx="4019632" cy="2675320"/>
+          </a:xfrm>
+        </p:spPr>
+        <p:txBody>
+          <a:bodyPr>
+            <a:normAutofit/>
+          </a:bodyPr>
+          <a:lstStyle/>
+          <a:p>
+            <a:endParaRPr lang="en-US" dirty="0"/>
           </a:p>
         </p:txBody>
       </p:sp>
     </p:spTree>
     <p:extLst>
       <p:ext uri="{BB962C8B-B14F-4D97-AF65-F5344CB8AC3E}">
-        <p14:creationId xmlns:p14="http://schemas.microsoft.com/office/powerpoint/2010/main" val="1179357605"/>
+        <p14:creationId xmlns:p14="http://schemas.microsoft.com/office/powerpoint/2010/main" val="3784093393"/>
       </p:ext>
     </p:extLst>
   </p:cSld>
@@ -5424,7 +6451,27 @@
           <a:bodyPr/>
           <a:lstStyle/>
           <a:p>
-            <a:endParaRPr lang="en-US"/>
+            <a:r>
+              <a:rPr lang="en-US" dirty="0"/>
+              <a:t>B</a:t>
+            </a:r>
+            <a:r>
+              <a:rPr lang="en-US" dirty="0" smtClean="0"/>
+              <a:t>ack</a:t>
+            </a:r>
+            <a:r>
+              <a:rPr lang="en-US" dirty="0"/>
+              <a:t>-</a:t>
+            </a:r>
+            <a:r>
+              <a:rPr lang="en-US" dirty="0" smtClean="0"/>
+              <a:t>button functionality</a:t>
+            </a:r>
+            <a:endParaRPr lang="en-US" dirty="0">
+              <a:solidFill>
+                <a:srgbClr val="A6A6A6"/>
+              </a:solidFill>
+            </a:endParaRPr>
           </a:p>
         </p:txBody>
       </p:sp>
@@ -5438,19 +6485,210 @@
             <p:ph idx="1"/>
           </p:nvPr>
         </p:nvSpPr>
-        <p:spPr/>
-        <p:txBody>
-          <a:bodyPr/>
-          <a:lstStyle/>
-          <a:p>
-            <a:endParaRPr lang="en-US"/>
+        <p:spPr>
+          <a:xfrm>
+            <a:off x="549275" y="1200152"/>
+            <a:ext cx="4019632" cy="2675320"/>
+          </a:xfrm>
+        </p:spPr>
+        <p:txBody>
+          <a:bodyPr>
+            <a:normAutofit/>
+          </a:bodyPr>
+          <a:lstStyle/>
+          <a:p>
+            <a:endParaRPr lang="en-US" dirty="0"/>
           </a:p>
         </p:txBody>
       </p:sp>
     </p:spTree>
     <p:extLst>
       <p:ext uri="{BB962C8B-B14F-4D97-AF65-F5344CB8AC3E}">
-        <p14:creationId xmlns:p14="http://schemas.microsoft.com/office/powerpoint/2010/main" val="4118524995"/>
+        <p14:creationId xmlns:p14="http://schemas.microsoft.com/office/powerpoint/2010/main" val="3300491785"/>
+      </p:ext>
+    </p:extLst>
+  </p:cSld>
+  <p:clrMapOvr>
+    <a:masterClrMapping/>
+  </p:clrMapOvr>
+  <p:timing>
+    <p:tnLst>
+      <p:par>
+        <p:cTn xmlns:p14="http://schemas.microsoft.com/office/powerpoint/2010/main" id="1" dur="indefinite" restart="never" nodeType="tmRoot"/>
+      </p:par>
+    </p:tnLst>
+  </p:timing>
+</p:sld>
+</file>
+
+<file path=ppt/slides/slide8.xml><?xml version="1.0" encoding="utf-8"?>
+<p:sld xmlns:a="http://schemas.openxmlformats.org/drawingml/2006/main" xmlns:r="http://schemas.openxmlformats.org/officeDocument/2006/relationships" xmlns:p="http://schemas.openxmlformats.org/presentationml/2006/main">
+  <p:cSld>
+    <p:spTree>
+      <p:nvGrpSpPr>
+        <p:cNvPr id="1" name=""/>
+        <p:cNvGrpSpPr/>
+        <p:nvPr/>
+      </p:nvGrpSpPr>
+      <p:grpSpPr>
+        <a:xfrm>
+          <a:off x="0" y="0"/>
+          <a:ext cx="0" cy="0"/>
+          <a:chOff x="0" y="0"/>
+          <a:chExt cx="0" cy="0"/>
+        </a:xfrm>
+      </p:grpSpPr>
+      <p:sp>
+        <p:nvSpPr>
+          <p:cNvPr id="2" name="Title 1"/>
+          <p:cNvSpPr>
+            <a:spLocks noGrp="1"/>
+          </p:cNvSpPr>
+          <p:nvPr>
+            <p:ph type="title"/>
+          </p:nvPr>
+        </p:nvSpPr>
+        <p:spPr/>
+        <p:txBody>
+          <a:bodyPr/>
+          <a:lstStyle/>
+          <a:p>
+            <a:r>
+              <a:rPr lang="en-US" dirty="0"/>
+              <a:t>Pagination</a:t>
+            </a:r>
+            <a:endParaRPr lang="en-US" dirty="0">
+              <a:solidFill>
+                <a:srgbClr val="A6A6A6"/>
+              </a:solidFill>
+            </a:endParaRPr>
+          </a:p>
+        </p:txBody>
+      </p:sp>
+      <p:sp>
+        <p:nvSpPr>
+          <p:cNvPr id="3" name="Content Placeholder 2"/>
+          <p:cNvSpPr>
+            <a:spLocks noGrp="1"/>
+          </p:cNvSpPr>
+          <p:nvPr>
+            <p:ph idx="1"/>
+          </p:nvPr>
+        </p:nvSpPr>
+        <p:spPr>
+          <a:xfrm>
+            <a:off x="549275" y="1200152"/>
+            <a:ext cx="4019632" cy="2675320"/>
+          </a:xfrm>
+        </p:spPr>
+        <p:txBody>
+          <a:bodyPr>
+            <a:normAutofit/>
+          </a:bodyPr>
+          <a:lstStyle/>
+          <a:p>
+            <a:endParaRPr lang="en-US" dirty="0"/>
+          </a:p>
+        </p:txBody>
+      </p:sp>
+    </p:spTree>
+    <p:extLst>
+      <p:ext uri="{BB962C8B-B14F-4D97-AF65-F5344CB8AC3E}">
+        <p14:creationId xmlns:p14="http://schemas.microsoft.com/office/powerpoint/2010/main" val="3656302879"/>
+      </p:ext>
+    </p:extLst>
+  </p:cSld>
+  <p:clrMapOvr>
+    <a:masterClrMapping/>
+  </p:clrMapOvr>
+  <p:timing>
+    <p:tnLst>
+      <p:par>
+        <p:cTn xmlns:p14="http://schemas.microsoft.com/office/powerpoint/2010/main" id="1" dur="indefinite" restart="never" nodeType="tmRoot"/>
+      </p:par>
+    </p:tnLst>
+  </p:timing>
+</p:sld>
+</file>
+
+<file path=ppt/slides/slide9.xml><?xml version="1.0" encoding="utf-8"?>
+<p:sld xmlns:a="http://schemas.openxmlformats.org/drawingml/2006/main" xmlns:r="http://schemas.openxmlformats.org/officeDocument/2006/relationships" xmlns:p="http://schemas.openxmlformats.org/presentationml/2006/main">
+  <p:cSld>
+    <p:spTree>
+      <p:nvGrpSpPr>
+        <p:cNvPr id="1" name=""/>
+        <p:cNvGrpSpPr/>
+        <p:nvPr/>
+      </p:nvGrpSpPr>
+      <p:grpSpPr>
+        <a:xfrm>
+          <a:off x="0" y="0"/>
+          <a:ext cx="0" cy="0"/>
+          <a:chOff x="0" y="0"/>
+          <a:chExt cx="0" cy="0"/>
+        </a:xfrm>
+      </p:grpSpPr>
+      <p:sp>
+        <p:nvSpPr>
+          <p:cNvPr id="2" name="Title 1"/>
+          <p:cNvSpPr>
+            <a:spLocks noGrp="1"/>
+          </p:cNvSpPr>
+          <p:nvPr>
+            <p:ph type="title"/>
+          </p:nvPr>
+        </p:nvSpPr>
+        <p:spPr/>
+        <p:txBody>
+          <a:bodyPr/>
+          <a:lstStyle/>
+          <a:p>
+            <a:r>
+              <a:rPr lang="en-US" dirty="0"/>
+              <a:t>Command </a:t>
+            </a:r>
+            <a:r>
+              <a:rPr lang="en-US" dirty="0" smtClean="0"/>
+              <a:t>history</a:t>
+            </a:r>
+            <a:endParaRPr lang="en-US" dirty="0">
+              <a:solidFill>
+                <a:srgbClr val="A6A6A6"/>
+              </a:solidFill>
+            </a:endParaRPr>
+          </a:p>
+        </p:txBody>
+      </p:sp>
+      <p:sp>
+        <p:nvSpPr>
+          <p:cNvPr id="3" name="Content Placeholder 2"/>
+          <p:cNvSpPr>
+            <a:spLocks noGrp="1"/>
+          </p:cNvSpPr>
+          <p:nvPr>
+            <p:ph idx="1"/>
+          </p:nvPr>
+        </p:nvSpPr>
+        <p:spPr>
+          <a:xfrm>
+            <a:off x="549275" y="1200152"/>
+            <a:ext cx="4019632" cy="2675320"/>
+          </a:xfrm>
+        </p:spPr>
+        <p:txBody>
+          <a:bodyPr>
+            <a:normAutofit/>
+          </a:bodyPr>
+          <a:lstStyle/>
+          <a:p>
+            <a:endParaRPr lang="en-US" dirty="0"/>
+          </a:p>
+        </p:txBody>
+      </p:sp>
+    </p:spTree>
+    <p:extLst>
+      <p:ext uri="{BB962C8B-B14F-4D97-AF65-F5344CB8AC3E}">
+        <p14:creationId xmlns:p14="http://schemas.microsoft.com/office/powerpoint/2010/main" val="3222510599"/>
       </p:ext>
     </p:extLst>
   </p:cSld>

</xml_diff>